<commit_message>
Working on .ppt presentation.
</commit_message>
<xml_diff>
--- a/semantic_classification_ppt.pptx
+++ b/semantic_classification_ppt.pptx
@@ -8,6 +8,9 @@
     <p:sldId id="256" r:id="rId2"/>
     <p:sldId id="257" r:id="rId3"/>
     <p:sldId id="258" r:id="rId4"/>
+    <p:sldId id="259" r:id="rId5"/>
+    <p:sldId id="260" r:id="rId6"/>
+    <p:sldId id="261" r:id="rId7"/>
   </p:sldIdLst>
   <p:sldSz cx="9144000" cy="6858000" type="screen4x3"/>
   <p:notesSz cx="6858000" cy="9144000"/>
@@ -240,7 +243,8 @@
           <a:p>
             <a:fld id="{E58A0508-6309-4EAB-8BA6-B85AA67F2995}" type="datetimeFigureOut">
               <a:rPr lang="en-US" smtClean="0"/>
-              <a:t>13-Dec-15</a:t>
+              <a:pPr/>
+              <a:t>12/13/2015</a:t>
             </a:fld>
             <a:endParaRPr lang="en-US"/>
           </a:p>
@@ -290,6 +294,7 @@
           <a:p>
             <a:fld id="{24935454-A831-4ABB-9B5E-C435C6E49619}" type="slidenum">
               <a:rPr lang="en-US" smtClean="0"/>
+              <a:pPr/>
               <a:t>‹#›</a:t>
             </a:fld>
             <a:endParaRPr lang="en-US"/>
@@ -299,7 +304,7 @@
     </p:spTree>
     <p:extLst>
       <p:ext uri="{BB962C8B-B14F-4D97-AF65-F5344CB8AC3E}">
-        <p14:creationId xmlns:p14="http://schemas.microsoft.com/office/powerpoint/2010/main" val="829197018"/>
+        <p14:creationId xmlns:p14="http://schemas.microsoft.com/office/powerpoint/2010/main" xmlns="" val="829197018"/>
       </p:ext>
     </p:extLst>
   </p:cSld>
@@ -422,7 +427,8 @@
           <a:p>
             <a:fld id="{E58A0508-6309-4EAB-8BA6-B85AA67F2995}" type="datetimeFigureOut">
               <a:rPr lang="en-US" smtClean="0"/>
-              <a:t>13-Dec-15</a:t>
+              <a:pPr/>
+              <a:t>12/13/2015</a:t>
             </a:fld>
             <a:endParaRPr lang="en-US"/>
           </a:p>
@@ -472,6 +478,7 @@
           <a:p>
             <a:fld id="{24935454-A831-4ABB-9B5E-C435C6E49619}" type="slidenum">
               <a:rPr lang="en-US" smtClean="0"/>
+              <a:pPr/>
               <a:t>‹#›</a:t>
             </a:fld>
             <a:endParaRPr lang="en-US"/>
@@ -481,7 +488,7 @@
     </p:spTree>
     <p:extLst>
       <p:ext uri="{BB962C8B-B14F-4D97-AF65-F5344CB8AC3E}">
-        <p14:creationId xmlns:p14="http://schemas.microsoft.com/office/powerpoint/2010/main" val="3499040603"/>
+        <p14:creationId xmlns:p14="http://schemas.microsoft.com/office/powerpoint/2010/main" xmlns="" val="3499040603"/>
       </p:ext>
     </p:extLst>
   </p:cSld>
@@ -614,7 +621,8 @@
           <a:p>
             <a:fld id="{E58A0508-6309-4EAB-8BA6-B85AA67F2995}" type="datetimeFigureOut">
               <a:rPr lang="en-US" smtClean="0"/>
-              <a:t>13-Dec-15</a:t>
+              <a:pPr/>
+              <a:t>12/13/2015</a:t>
             </a:fld>
             <a:endParaRPr lang="en-US"/>
           </a:p>
@@ -664,6 +672,7 @@
           <a:p>
             <a:fld id="{24935454-A831-4ABB-9B5E-C435C6E49619}" type="slidenum">
               <a:rPr lang="en-US" smtClean="0"/>
+              <a:pPr/>
               <a:t>‹#›</a:t>
             </a:fld>
             <a:endParaRPr lang="en-US"/>
@@ -673,7 +682,7 @@
     </p:spTree>
     <p:extLst>
       <p:ext uri="{BB962C8B-B14F-4D97-AF65-F5344CB8AC3E}">
-        <p14:creationId xmlns:p14="http://schemas.microsoft.com/office/powerpoint/2010/main" val="1294682803"/>
+        <p14:creationId xmlns:p14="http://schemas.microsoft.com/office/powerpoint/2010/main" xmlns="" val="1294682803"/>
       </p:ext>
     </p:extLst>
   </p:cSld>
@@ -796,7 +805,8 @@
           <a:p>
             <a:fld id="{E58A0508-6309-4EAB-8BA6-B85AA67F2995}" type="datetimeFigureOut">
               <a:rPr lang="en-US" smtClean="0"/>
-              <a:t>13-Dec-15</a:t>
+              <a:pPr/>
+              <a:t>12/13/2015</a:t>
             </a:fld>
             <a:endParaRPr lang="en-US"/>
           </a:p>
@@ -846,6 +856,7 @@
           <a:p>
             <a:fld id="{24935454-A831-4ABB-9B5E-C435C6E49619}" type="slidenum">
               <a:rPr lang="en-US" smtClean="0"/>
+              <a:pPr/>
               <a:t>‹#›</a:t>
             </a:fld>
             <a:endParaRPr lang="en-US"/>
@@ -855,7 +866,7 @@
     </p:spTree>
     <p:extLst>
       <p:ext uri="{BB962C8B-B14F-4D97-AF65-F5344CB8AC3E}">
-        <p14:creationId xmlns:p14="http://schemas.microsoft.com/office/powerpoint/2010/main" val="141096533"/>
+        <p14:creationId xmlns:p14="http://schemas.microsoft.com/office/powerpoint/2010/main" xmlns="" val="141096533"/>
       </p:ext>
     </p:extLst>
   </p:cSld>
@@ -1000,7 +1011,8 @@
           <a:p>
             <a:fld id="{E58A0508-6309-4EAB-8BA6-B85AA67F2995}" type="datetimeFigureOut">
               <a:rPr lang="en-US" smtClean="0"/>
-              <a:t>13-Dec-15</a:t>
+              <a:pPr/>
+              <a:t>12/13/2015</a:t>
             </a:fld>
             <a:endParaRPr lang="en-US"/>
           </a:p>
@@ -1050,6 +1062,7 @@
           <a:p>
             <a:fld id="{24935454-A831-4ABB-9B5E-C435C6E49619}" type="slidenum">
               <a:rPr lang="en-US" smtClean="0"/>
+              <a:pPr/>
               <a:t>‹#›</a:t>
             </a:fld>
             <a:endParaRPr lang="en-US"/>
@@ -1059,7 +1072,7 @@
     </p:spTree>
     <p:extLst>
       <p:ext uri="{BB962C8B-B14F-4D97-AF65-F5344CB8AC3E}">
-        <p14:creationId xmlns:p14="http://schemas.microsoft.com/office/powerpoint/2010/main" val="1790837754"/>
+        <p14:creationId xmlns:p14="http://schemas.microsoft.com/office/powerpoint/2010/main" xmlns="" val="1790837754"/>
       </p:ext>
     </p:extLst>
   </p:cSld>
@@ -1300,7 +1313,8 @@
           <a:p>
             <a:fld id="{E58A0508-6309-4EAB-8BA6-B85AA67F2995}" type="datetimeFigureOut">
               <a:rPr lang="en-US" smtClean="0"/>
-              <a:t>13-Dec-15</a:t>
+              <a:pPr/>
+              <a:t>12/13/2015</a:t>
             </a:fld>
             <a:endParaRPr lang="en-US"/>
           </a:p>
@@ -1350,6 +1364,7 @@
           <a:p>
             <a:fld id="{24935454-A831-4ABB-9B5E-C435C6E49619}" type="slidenum">
               <a:rPr lang="en-US" smtClean="0"/>
+              <a:pPr/>
               <a:t>‹#›</a:t>
             </a:fld>
             <a:endParaRPr lang="en-US"/>
@@ -1359,7 +1374,7 @@
     </p:spTree>
     <p:extLst>
       <p:ext uri="{BB962C8B-B14F-4D97-AF65-F5344CB8AC3E}">
-        <p14:creationId xmlns:p14="http://schemas.microsoft.com/office/powerpoint/2010/main" val="4294623358"/>
+        <p14:creationId xmlns:p14="http://schemas.microsoft.com/office/powerpoint/2010/main" xmlns="" val="4294623358"/>
       </p:ext>
     </p:extLst>
   </p:cSld>
@@ -1734,7 +1749,8 @@
           <a:p>
             <a:fld id="{E58A0508-6309-4EAB-8BA6-B85AA67F2995}" type="datetimeFigureOut">
               <a:rPr lang="en-US" smtClean="0"/>
-              <a:t>13-Dec-15</a:t>
+              <a:pPr/>
+              <a:t>12/13/2015</a:t>
             </a:fld>
             <a:endParaRPr lang="en-US"/>
           </a:p>
@@ -1784,6 +1800,7 @@
           <a:p>
             <a:fld id="{24935454-A831-4ABB-9B5E-C435C6E49619}" type="slidenum">
               <a:rPr lang="en-US" smtClean="0"/>
+              <a:pPr/>
               <a:t>‹#›</a:t>
             </a:fld>
             <a:endParaRPr lang="en-US"/>
@@ -1793,7 +1810,7 @@
     </p:spTree>
     <p:extLst>
       <p:ext uri="{BB962C8B-B14F-4D97-AF65-F5344CB8AC3E}">
-        <p14:creationId xmlns:p14="http://schemas.microsoft.com/office/powerpoint/2010/main" val="2177959939"/>
+        <p14:creationId xmlns:p14="http://schemas.microsoft.com/office/powerpoint/2010/main" xmlns="" val="2177959939"/>
       </p:ext>
     </p:extLst>
   </p:cSld>
@@ -1864,7 +1881,8 @@
           <a:p>
             <a:fld id="{E58A0508-6309-4EAB-8BA6-B85AA67F2995}" type="datetimeFigureOut">
               <a:rPr lang="en-US" smtClean="0"/>
-              <a:t>13-Dec-15</a:t>
+              <a:pPr/>
+              <a:t>12/13/2015</a:t>
             </a:fld>
             <a:endParaRPr lang="en-US"/>
           </a:p>
@@ -1914,6 +1932,7 @@
           <a:p>
             <a:fld id="{24935454-A831-4ABB-9B5E-C435C6E49619}" type="slidenum">
               <a:rPr lang="en-US" smtClean="0"/>
+              <a:pPr/>
               <a:t>‹#›</a:t>
             </a:fld>
             <a:endParaRPr lang="en-US"/>
@@ -1923,7 +1942,7 @@
     </p:spTree>
     <p:extLst>
       <p:ext uri="{BB962C8B-B14F-4D97-AF65-F5344CB8AC3E}">
-        <p14:creationId xmlns:p14="http://schemas.microsoft.com/office/powerpoint/2010/main" val="3647597071"/>
+        <p14:creationId xmlns:p14="http://schemas.microsoft.com/office/powerpoint/2010/main" xmlns="" val="3647597071"/>
       </p:ext>
     </p:extLst>
   </p:cSld>
@@ -1971,7 +1990,8 @@
           <a:p>
             <a:fld id="{E58A0508-6309-4EAB-8BA6-B85AA67F2995}" type="datetimeFigureOut">
               <a:rPr lang="en-US" smtClean="0"/>
-              <a:t>13-Dec-15</a:t>
+              <a:pPr/>
+              <a:t>12/13/2015</a:t>
             </a:fld>
             <a:endParaRPr lang="en-US"/>
           </a:p>
@@ -2021,6 +2041,7 @@
           <a:p>
             <a:fld id="{24935454-A831-4ABB-9B5E-C435C6E49619}" type="slidenum">
               <a:rPr lang="en-US" smtClean="0"/>
+              <a:pPr/>
               <a:t>‹#›</a:t>
             </a:fld>
             <a:endParaRPr lang="en-US"/>
@@ -2030,7 +2051,7 @@
     </p:spTree>
     <p:extLst>
       <p:ext uri="{BB962C8B-B14F-4D97-AF65-F5344CB8AC3E}">
-        <p14:creationId xmlns:p14="http://schemas.microsoft.com/office/powerpoint/2010/main" val="2326664693"/>
+        <p14:creationId xmlns:p14="http://schemas.microsoft.com/office/powerpoint/2010/main" xmlns="" val="2326664693"/>
       </p:ext>
     </p:extLst>
   </p:cSld>
@@ -2260,7 +2281,8 @@
           <a:p>
             <a:fld id="{E58A0508-6309-4EAB-8BA6-B85AA67F2995}" type="datetimeFigureOut">
               <a:rPr lang="en-US" smtClean="0"/>
-              <a:t>13-Dec-15</a:t>
+              <a:pPr/>
+              <a:t>12/13/2015</a:t>
             </a:fld>
             <a:endParaRPr lang="en-US"/>
           </a:p>
@@ -2310,6 +2332,7 @@
           <a:p>
             <a:fld id="{24935454-A831-4ABB-9B5E-C435C6E49619}" type="slidenum">
               <a:rPr lang="en-US" smtClean="0"/>
+              <a:pPr/>
               <a:t>‹#›</a:t>
             </a:fld>
             <a:endParaRPr lang="en-US"/>
@@ -2319,7 +2342,7 @@
     </p:spTree>
     <p:extLst>
       <p:ext uri="{BB962C8B-B14F-4D97-AF65-F5344CB8AC3E}">
-        <p14:creationId xmlns:p14="http://schemas.microsoft.com/office/powerpoint/2010/main" val="2153272923"/>
+        <p14:creationId xmlns:p14="http://schemas.microsoft.com/office/powerpoint/2010/main" xmlns="" val="2153272923"/>
       </p:ext>
     </p:extLst>
   </p:cSld>
@@ -2529,7 +2552,8 @@
           <a:p>
             <a:fld id="{E58A0508-6309-4EAB-8BA6-B85AA67F2995}" type="datetimeFigureOut">
               <a:rPr lang="en-US" smtClean="0"/>
-              <a:t>13-Dec-15</a:t>
+              <a:pPr/>
+              <a:t>12/13/2015</a:t>
             </a:fld>
             <a:endParaRPr lang="en-US"/>
           </a:p>
@@ -2579,6 +2603,7 @@
           <a:p>
             <a:fld id="{24935454-A831-4ABB-9B5E-C435C6E49619}" type="slidenum">
               <a:rPr lang="en-US" smtClean="0"/>
+              <a:pPr/>
               <a:t>‹#›</a:t>
             </a:fld>
             <a:endParaRPr lang="en-US"/>
@@ -2588,7 +2613,7 @@
     </p:spTree>
     <p:extLst>
       <p:ext uri="{BB962C8B-B14F-4D97-AF65-F5344CB8AC3E}">
-        <p14:creationId xmlns:p14="http://schemas.microsoft.com/office/powerpoint/2010/main" val="3765760839"/>
+        <p14:creationId xmlns:p14="http://schemas.microsoft.com/office/powerpoint/2010/main" xmlns="" val="3765760839"/>
       </p:ext>
     </p:extLst>
   </p:cSld>
@@ -2604,7 +2629,7 @@
     <p:bg>
       <p:bgPr>
         <a:blipFill dpi="0" rotWithShape="0">
-          <a:blip r:embed="rId13"/>
+          <a:blip r:embed="rId13" cstate="print"/>
           <a:srcRect/>
           <a:stretch>
             <a:fillRect/>
@@ -2652,14 +2677,14 @@
           <a:effectLst/>
           <a:extLst>
             <a:ext uri="{909E8E84-426E-40DD-AFC4-6F175D3DCCD1}">
-              <a14:hiddenFill xmlns:a14="http://schemas.microsoft.com/office/drawing/2010/main">
+              <a14:hiddenFill xmlns:a14="http://schemas.microsoft.com/office/drawing/2010/main" xmlns="">
                 <a:solidFill>
                   <a:schemeClr val="accent1"/>
                 </a:solidFill>
               </a14:hiddenFill>
             </a:ext>
             <a:ext uri="{91240B29-F687-4F45-9708-019B960494DF}">
-              <a14:hiddenLine xmlns:a14="http://schemas.microsoft.com/office/drawing/2010/main" w="9525">
+              <a14:hiddenLine xmlns:a14="http://schemas.microsoft.com/office/drawing/2010/main" xmlns="" w="9525">
                 <a:solidFill>
                   <a:schemeClr val="tx1"/>
                 </a:solidFill>
@@ -2669,7 +2694,7 @@
               </a14:hiddenLine>
             </a:ext>
             <a:ext uri="{AF507438-7753-43E0-B8FC-AC1667EBCBE1}">
-              <a14:hiddenEffects xmlns:a14="http://schemas.microsoft.com/office/drawing/2010/main">
+              <a14:hiddenEffects xmlns:a14="http://schemas.microsoft.com/office/drawing/2010/main" xmlns="">
                 <a:effectLst>
                   <a:outerShdw dist="35921" dir="2700000" algn="ctr" rotWithShape="0">
                     <a:schemeClr val="bg2"/>
@@ -2720,14 +2745,14 @@
           <a:effectLst/>
           <a:extLst>
             <a:ext uri="{909E8E84-426E-40DD-AFC4-6F175D3DCCD1}">
-              <a14:hiddenFill xmlns:a14="http://schemas.microsoft.com/office/drawing/2010/main">
+              <a14:hiddenFill xmlns:a14="http://schemas.microsoft.com/office/drawing/2010/main" xmlns="">
                 <a:solidFill>
                   <a:schemeClr val="accent1"/>
                 </a:solidFill>
               </a14:hiddenFill>
             </a:ext>
             <a:ext uri="{91240B29-F687-4F45-9708-019B960494DF}">
-              <a14:hiddenLine xmlns:a14="http://schemas.microsoft.com/office/drawing/2010/main" w="9525">
+              <a14:hiddenLine xmlns:a14="http://schemas.microsoft.com/office/drawing/2010/main" xmlns="" w="9525">
                 <a:solidFill>
                   <a:schemeClr val="tx1"/>
                 </a:solidFill>
@@ -2737,7 +2762,7 @@
               </a14:hiddenLine>
             </a:ext>
             <a:ext uri="{AF507438-7753-43E0-B8FC-AC1667EBCBE1}">
-              <a14:hiddenEffects xmlns:a14="http://schemas.microsoft.com/office/drawing/2010/main">
+              <a14:hiddenEffects xmlns:a14="http://schemas.microsoft.com/office/drawing/2010/main" xmlns="">
                 <a:effectLst>
                   <a:outerShdw dist="35921" dir="2700000" algn="ctr" rotWithShape="0">
                     <a:schemeClr val="bg2"/>
@@ -2816,14 +2841,14 @@
           <a:effectLst/>
           <a:extLst>
             <a:ext uri="{909E8E84-426E-40DD-AFC4-6F175D3DCCD1}">
-              <a14:hiddenFill xmlns:a14="http://schemas.microsoft.com/office/drawing/2010/main">
+              <a14:hiddenFill xmlns:a14="http://schemas.microsoft.com/office/drawing/2010/main" xmlns="">
                 <a:solidFill>
                   <a:schemeClr val="accent1"/>
                 </a:solidFill>
               </a14:hiddenFill>
             </a:ext>
             <a:ext uri="{91240B29-F687-4F45-9708-019B960494DF}">
-              <a14:hiddenLine xmlns:a14="http://schemas.microsoft.com/office/drawing/2010/main" w="9525">
+              <a14:hiddenLine xmlns:a14="http://schemas.microsoft.com/office/drawing/2010/main" xmlns="" w="9525">
                 <a:solidFill>
                   <a:schemeClr val="tx1"/>
                 </a:solidFill>
@@ -2833,7 +2858,7 @@
               </a14:hiddenLine>
             </a:ext>
             <a:ext uri="{AF507438-7753-43E0-B8FC-AC1667EBCBE1}">
-              <a14:hiddenEffects xmlns:a14="http://schemas.microsoft.com/office/drawing/2010/main">
+              <a14:hiddenEffects xmlns:a14="http://schemas.microsoft.com/office/drawing/2010/main" xmlns="">
                 <a:effectLst>
                   <a:outerShdw dist="35921" dir="2700000" algn="ctr" rotWithShape="0">
                     <a:schemeClr val="bg2"/>
@@ -2857,7 +2882,8 @@
           <a:p>
             <a:fld id="{E58A0508-6309-4EAB-8BA6-B85AA67F2995}" type="datetimeFigureOut">
               <a:rPr lang="en-US" smtClean="0"/>
-              <a:t>13-Dec-15</a:t>
+              <a:pPr/>
+              <a:t>12/13/2015</a:t>
             </a:fld>
             <a:endParaRPr lang="en-US"/>
           </a:p>
@@ -2888,14 +2914,14 @@
           <a:effectLst/>
           <a:extLst>
             <a:ext uri="{909E8E84-426E-40DD-AFC4-6F175D3DCCD1}">
-              <a14:hiddenFill xmlns:a14="http://schemas.microsoft.com/office/drawing/2010/main">
+              <a14:hiddenFill xmlns:a14="http://schemas.microsoft.com/office/drawing/2010/main" xmlns="">
                 <a:solidFill>
                   <a:schemeClr val="accent1"/>
                 </a:solidFill>
               </a14:hiddenFill>
             </a:ext>
             <a:ext uri="{91240B29-F687-4F45-9708-019B960494DF}">
-              <a14:hiddenLine xmlns:a14="http://schemas.microsoft.com/office/drawing/2010/main" w="9525">
+              <a14:hiddenLine xmlns:a14="http://schemas.microsoft.com/office/drawing/2010/main" xmlns="" w="9525">
                 <a:solidFill>
                   <a:schemeClr val="tx1"/>
                 </a:solidFill>
@@ -2905,7 +2931,7 @@
               </a14:hiddenLine>
             </a:ext>
             <a:ext uri="{AF507438-7753-43E0-B8FC-AC1667EBCBE1}">
-              <a14:hiddenEffects xmlns:a14="http://schemas.microsoft.com/office/drawing/2010/main">
+              <a14:hiddenEffects xmlns:a14="http://schemas.microsoft.com/office/drawing/2010/main" xmlns="">
                 <a:effectLst>
                   <a:outerShdw dist="35921" dir="2700000" algn="ctr" rotWithShape="0">
                     <a:schemeClr val="bg2"/>
@@ -2956,14 +2982,14 @@
           <a:effectLst/>
           <a:extLst>
             <a:ext uri="{909E8E84-426E-40DD-AFC4-6F175D3DCCD1}">
-              <a14:hiddenFill xmlns:a14="http://schemas.microsoft.com/office/drawing/2010/main">
+              <a14:hiddenFill xmlns:a14="http://schemas.microsoft.com/office/drawing/2010/main" xmlns="">
                 <a:solidFill>
                   <a:schemeClr val="accent1"/>
                 </a:solidFill>
               </a14:hiddenFill>
             </a:ext>
             <a:ext uri="{91240B29-F687-4F45-9708-019B960494DF}">
-              <a14:hiddenLine xmlns:a14="http://schemas.microsoft.com/office/drawing/2010/main" w="9525">
+              <a14:hiddenLine xmlns:a14="http://schemas.microsoft.com/office/drawing/2010/main" xmlns="" w="9525">
                 <a:solidFill>
                   <a:schemeClr val="tx1"/>
                 </a:solidFill>
@@ -2973,7 +2999,7 @@
               </a14:hiddenLine>
             </a:ext>
             <a:ext uri="{AF507438-7753-43E0-B8FC-AC1667EBCBE1}">
-              <a14:hiddenEffects xmlns:a14="http://schemas.microsoft.com/office/drawing/2010/main">
+              <a14:hiddenEffects xmlns:a14="http://schemas.microsoft.com/office/drawing/2010/main" xmlns="">
                 <a:effectLst>
                   <a:outerShdw dist="35921" dir="2700000" algn="ctr" rotWithShape="0">
                     <a:schemeClr val="bg2"/>
@@ -2997,6 +3023,7 @@
           <a:p>
             <a:fld id="{24935454-A831-4ABB-9B5E-C435C6E49619}" type="slidenum">
               <a:rPr lang="en-US" smtClean="0"/>
+              <a:pPr/>
               <a:t>‹#›</a:t>
             </a:fld>
             <a:endParaRPr lang="en-US"/>
@@ -3544,7 +3571,7 @@
           <p:nvPr/>
         </p:nvPicPr>
         <p:blipFill>
-          <a:blip r:embed="rId3"/>
+          <a:blip r:embed="rId3" cstate="print"/>
           <a:srcRect/>
           <a:stretch>
             <a:fillRect/>
@@ -3570,7 +3597,7 @@
     </p:spTree>
     <p:extLst>
       <p:ext uri="{BB962C8B-B14F-4D97-AF65-F5344CB8AC3E}">
-        <p14:creationId xmlns:p14="http://schemas.microsoft.com/office/powerpoint/2010/main" val="2329006346"/>
+        <p14:creationId xmlns:p14="http://schemas.microsoft.com/office/powerpoint/2010/main" xmlns="" val="2329006346"/>
       </p:ext>
     </p:extLst>
   </p:cSld>
@@ -3684,7 +3711,7 @@
     </p:spTree>
     <p:extLst>
       <p:ext uri="{BB962C8B-B14F-4D97-AF65-F5344CB8AC3E}">
-        <p14:creationId xmlns:p14="http://schemas.microsoft.com/office/powerpoint/2010/main" val="2675446113"/>
+        <p14:creationId xmlns:p14="http://schemas.microsoft.com/office/powerpoint/2010/main" xmlns="" val="2675446113"/>
       </p:ext>
     </p:extLst>
   </p:cSld>
@@ -3766,12 +3793,29 @@
           <a:lstStyle/>
           <a:p>
             <a:r>
-              <a:rPr lang="sr-Latn-RS" smtClean="0">
+              <a:rPr lang="sr-Latn-RS" dirty="0" smtClean="0">
                 <a:latin typeface="Calibri" pitchFamily="34" charset="0"/>
               </a:rPr>
-              <a:t>Preuzimanje željenog sadržaja iz teksta, bez njegovog kompletnog čitanja.</a:t>
-            </a:r>
-            <a:endParaRPr lang="en-US" dirty="0">
+              <a:t>Preuzimanje željenog sadržaja iz teksta, bez njegovog kompletnog čitanja</a:t>
+            </a:r>
+            <a:r>
+              <a:rPr lang="sr-Latn-RS" dirty="0" smtClean="0">
+                <a:latin typeface="Calibri" pitchFamily="34" charset="0"/>
+              </a:rPr>
+              <a:t>.</a:t>
+            </a:r>
+            <a:endParaRPr lang="sr-Latn-RS" dirty="0">
+              <a:latin typeface="Calibri" pitchFamily="34" charset="0"/>
+            </a:endParaRPr>
+          </a:p>
+          <a:p>
+            <a:r>
+              <a:rPr lang="sr-Latn-RS" dirty="0" smtClean="0">
+                <a:latin typeface="Calibri" pitchFamily="34" charset="0"/>
+              </a:rPr>
+              <a:t>Semantička analiza teksta kao takva.</a:t>
+            </a:r>
+            <a:endParaRPr lang="sr-Latn-RS" dirty="0" smtClean="0">
               <a:latin typeface="Calibri" pitchFamily="34" charset="0"/>
             </a:endParaRPr>
           </a:p>
@@ -3780,9 +3824,261 @@
     </p:spTree>
     <p:extLst>
       <p:ext uri="{BB962C8B-B14F-4D97-AF65-F5344CB8AC3E}">
-        <p14:creationId xmlns:p14="http://schemas.microsoft.com/office/powerpoint/2010/main" val="2572676877"/>
+        <p14:creationId xmlns:p14="http://schemas.microsoft.com/office/powerpoint/2010/main" xmlns="" val="2572676877"/>
       </p:ext>
     </p:extLst>
+  </p:cSld>
+  <p:clrMapOvr>
+    <a:masterClrMapping/>
+  </p:clrMapOvr>
+</p:sld>
+</file>
+
+<file path=ppt/slides/slide4.xml><?xml version="1.0" encoding="utf-8"?>
+<p:sld xmlns:a="http://schemas.openxmlformats.org/drawingml/2006/main" xmlns:r="http://schemas.openxmlformats.org/officeDocument/2006/relationships" xmlns:p="http://schemas.openxmlformats.org/presentationml/2006/main">
+  <p:cSld>
+    <p:spTree>
+      <p:nvGrpSpPr>
+        <p:cNvPr id="1" name=""/>
+        <p:cNvGrpSpPr/>
+        <p:nvPr/>
+      </p:nvGrpSpPr>
+      <p:grpSpPr>
+        <a:xfrm>
+          <a:off x="0" y="0"/>
+          <a:ext cx="0" cy="0"/>
+          <a:chOff x="0" y="0"/>
+          <a:chExt cx="0" cy="0"/>
+        </a:xfrm>
+      </p:grpSpPr>
+      <p:sp>
+        <p:nvSpPr>
+          <p:cNvPr id="2" name="Title 1"/>
+          <p:cNvSpPr>
+            <a:spLocks noGrp="1"/>
+          </p:cNvSpPr>
+          <p:nvPr>
+            <p:ph type="title"/>
+          </p:nvPr>
+        </p:nvSpPr>
+        <p:spPr/>
+        <p:txBody>
+          <a:bodyPr/>
+          <a:lstStyle/>
+          <a:p>
+            <a:r>
+              <a:rPr lang="sr-Latn-RS" dirty="0" smtClean="0"/>
+              <a:t>Slična rešenja</a:t>
+            </a:r>
+            <a:endParaRPr lang="en-US" dirty="0"/>
+          </a:p>
+        </p:txBody>
+      </p:sp>
+      <p:sp>
+        <p:nvSpPr>
+          <p:cNvPr id="3" name="Content Placeholder 2"/>
+          <p:cNvSpPr>
+            <a:spLocks noGrp="1"/>
+          </p:cNvSpPr>
+          <p:nvPr>
+            <p:ph idx="1"/>
+          </p:nvPr>
+        </p:nvSpPr>
+        <p:spPr>
+          <a:xfrm>
+            <a:off x="609600" y="1600200"/>
+            <a:ext cx="8077200" cy="4525963"/>
+          </a:xfrm>
+        </p:spPr>
+        <p:txBody>
+          <a:bodyPr/>
+          <a:lstStyle/>
+          <a:p>
+            <a:r>
+              <a:rPr lang="sr-Latn-RS" dirty="0" smtClean="0"/>
+              <a:t>Naive Bayes Classificator</a:t>
+            </a:r>
+          </a:p>
+          <a:p>
+            <a:r>
+              <a:rPr lang="sr-Latn-RS" dirty="0" smtClean="0"/>
+              <a:t>Random Decision Forests</a:t>
+            </a:r>
+          </a:p>
+          <a:p>
+            <a:r>
+              <a:rPr lang="sr-Latn-RS" dirty="0" smtClean="0"/>
+              <a:t>Support Vector Machines</a:t>
+            </a:r>
+          </a:p>
+          <a:p>
+            <a:r>
+              <a:rPr lang="sr-Latn-RS" dirty="0" smtClean="0"/>
+              <a:t>Convolutional Neural Networks</a:t>
+            </a:r>
+            <a:endParaRPr lang="en-US" dirty="0"/>
+          </a:p>
+        </p:txBody>
+      </p:sp>
+    </p:spTree>
+  </p:cSld>
+  <p:clrMapOvr>
+    <a:masterClrMapping/>
+  </p:clrMapOvr>
+</p:sld>
+</file>
+
+<file path=ppt/slides/slide5.xml><?xml version="1.0" encoding="utf-8"?>
+<p:sld xmlns:a="http://schemas.openxmlformats.org/drawingml/2006/main" xmlns:r="http://schemas.openxmlformats.org/officeDocument/2006/relationships" xmlns:p="http://schemas.openxmlformats.org/presentationml/2006/main">
+  <p:cSld>
+    <p:spTree>
+      <p:nvGrpSpPr>
+        <p:cNvPr id="1" name=""/>
+        <p:cNvGrpSpPr/>
+        <p:nvPr/>
+      </p:nvGrpSpPr>
+      <p:grpSpPr>
+        <a:xfrm>
+          <a:off x="0" y="0"/>
+          <a:ext cx="0" cy="0"/>
+          <a:chOff x="0" y="0"/>
+          <a:chExt cx="0" cy="0"/>
+        </a:xfrm>
+      </p:grpSpPr>
+      <p:sp>
+        <p:nvSpPr>
+          <p:cNvPr id="2" name="Title 1"/>
+          <p:cNvSpPr>
+            <a:spLocks noGrp="1"/>
+          </p:cNvSpPr>
+          <p:nvPr>
+            <p:ph type="title"/>
+          </p:nvPr>
+        </p:nvSpPr>
+        <p:spPr/>
+        <p:txBody>
+          <a:bodyPr/>
+          <a:lstStyle/>
+          <a:p>
+            <a:r>
+              <a:rPr lang="sr-Latn-RS" dirty="0" smtClean="0"/>
+              <a:t>Data Set</a:t>
+            </a:r>
+            <a:endParaRPr lang="en-US" dirty="0"/>
+          </a:p>
+        </p:txBody>
+      </p:sp>
+      <p:sp>
+        <p:nvSpPr>
+          <p:cNvPr id="3" name="Content Placeholder 2"/>
+          <p:cNvSpPr>
+            <a:spLocks noGrp="1"/>
+          </p:cNvSpPr>
+          <p:nvPr>
+            <p:ph idx="1"/>
+          </p:nvPr>
+        </p:nvSpPr>
+        <p:spPr/>
+        <p:txBody>
+          <a:bodyPr/>
+          <a:lstStyle/>
+          <a:p>
+            <a:endParaRPr lang="en-US"/>
+          </a:p>
+        </p:txBody>
+      </p:sp>
+    </p:spTree>
+  </p:cSld>
+  <p:clrMapOvr>
+    <a:masterClrMapping/>
+  </p:clrMapOvr>
+</p:sld>
+</file>
+
+<file path=ppt/slides/slide6.xml><?xml version="1.0" encoding="utf-8"?>
+<p:sld xmlns:a="http://schemas.openxmlformats.org/drawingml/2006/main" xmlns:r="http://schemas.openxmlformats.org/officeDocument/2006/relationships" xmlns:p="http://schemas.openxmlformats.org/presentationml/2006/main">
+  <p:cSld>
+    <p:spTree>
+      <p:nvGrpSpPr>
+        <p:cNvPr id="1" name=""/>
+        <p:cNvGrpSpPr/>
+        <p:nvPr/>
+      </p:nvGrpSpPr>
+      <p:grpSpPr>
+        <a:xfrm>
+          <a:off x="0" y="0"/>
+          <a:ext cx="0" cy="0"/>
+          <a:chOff x="0" y="0"/>
+          <a:chExt cx="0" cy="0"/>
+        </a:xfrm>
+      </p:grpSpPr>
+      <p:sp>
+        <p:nvSpPr>
+          <p:cNvPr id="2" name="Title 1"/>
+          <p:cNvSpPr>
+            <a:spLocks noGrp="1"/>
+          </p:cNvSpPr>
+          <p:nvPr>
+            <p:ph type="title"/>
+          </p:nvPr>
+        </p:nvSpPr>
+        <p:spPr/>
+        <p:txBody>
+          <a:bodyPr/>
+          <a:lstStyle/>
+          <a:p>
+            <a:r>
+              <a:rPr lang="sr-Latn-RS" dirty="0" smtClean="0"/>
+              <a:t>Implementacija</a:t>
+            </a:r>
+            <a:endParaRPr lang="en-US" dirty="0"/>
+          </a:p>
+        </p:txBody>
+      </p:sp>
+      <p:sp>
+        <p:nvSpPr>
+          <p:cNvPr id="3" name="Content Placeholder 2"/>
+          <p:cNvSpPr>
+            <a:spLocks noGrp="1"/>
+          </p:cNvSpPr>
+          <p:nvPr>
+            <p:ph idx="1"/>
+          </p:nvPr>
+        </p:nvSpPr>
+        <p:spPr>
+          <a:xfrm>
+            <a:off x="609600" y="1600200"/>
+            <a:ext cx="8077200" cy="4525963"/>
+          </a:xfrm>
+        </p:spPr>
+        <p:txBody>
+          <a:bodyPr/>
+          <a:lstStyle/>
+          <a:p>
+            <a:r>
+              <a:rPr lang="en-US" dirty="0" smtClean="0"/>
+              <a:t>W</a:t>
+            </a:r>
+            <a:r>
+              <a:rPr lang="sr-Latn-RS" dirty="0" smtClean="0"/>
+              <a:t>ord2vec</a:t>
+            </a:r>
+          </a:p>
+          <a:p>
+            <a:r>
+              <a:rPr lang="sr-Latn-RS" dirty="0" smtClean="0"/>
+              <a:t>CNN</a:t>
+            </a:r>
+          </a:p>
+          <a:p>
+            <a:pPr>
+              <a:buNone/>
+            </a:pPr>
+            <a:endParaRPr lang="en-US" dirty="0"/>
+          </a:p>
+        </p:txBody>
+      </p:sp>
+    </p:spTree>
   </p:cSld>
   <p:clrMapOvr>
     <a:masterClrMapping/>

</xml_diff>

<commit_message>
First checkpoint ppt presentation Presentation completed.
</commit_message>
<xml_diff>
--- a/semantic_classification_ppt.pptx
+++ b/semantic_classification_ppt.pptx
@@ -10,7 +10,10 @@
     <p:sldId id="258" r:id="rId4"/>
     <p:sldId id="259" r:id="rId5"/>
     <p:sldId id="260" r:id="rId6"/>
-    <p:sldId id="261" r:id="rId7"/>
+    <p:sldId id="262" r:id="rId7"/>
+    <p:sldId id="263" r:id="rId8"/>
+    <p:sldId id="261" r:id="rId9"/>
+    <p:sldId id="264" r:id="rId10"/>
   </p:sldIdLst>
   <p:sldSz cx="9144000" cy="6858000" type="screen4x3"/>
   <p:notesSz cx="6858000" cy="9144000"/>
@@ -244,7 +247,7 @@
             <a:fld id="{E58A0508-6309-4EAB-8BA6-B85AA67F2995}" type="datetimeFigureOut">
               <a:rPr lang="en-US" smtClean="0"/>
               <a:pPr/>
-              <a:t>12/13/2015</a:t>
+              <a:t>13-Dec-15</a:t>
             </a:fld>
             <a:endParaRPr lang="en-US"/>
           </a:p>
@@ -304,13 +307,16 @@
     </p:spTree>
     <p:extLst>
       <p:ext uri="{BB962C8B-B14F-4D97-AF65-F5344CB8AC3E}">
-        <p14:creationId xmlns:p14="http://schemas.microsoft.com/office/powerpoint/2010/main" xmlns="" val="829197018"/>
+        <p14:creationId xmlns:p14="http://schemas.microsoft.com/office/powerpoint/2010/main" val="829197018"/>
       </p:ext>
     </p:extLst>
   </p:cSld>
   <p:clrMapOvr>
     <a:masterClrMapping/>
   </p:clrMapOvr>
+  <p:transition spd="slow">
+    <p:push dir="u"/>
+  </p:transition>
 </p:sldLayout>
 </file>
 
@@ -428,7 +434,7 @@
             <a:fld id="{E58A0508-6309-4EAB-8BA6-B85AA67F2995}" type="datetimeFigureOut">
               <a:rPr lang="en-US" smtClean="0"/>
               <a:pPr/>
-              <a:t>12/13/2015</a:t>
+              <a:t>13-Dec-15</a:t>
             </a:fld>
             <a:endParaRPr lang="en-US"/>
           </a:p>
@@ -488,13 +494,16 @@
     </p:spTree>
     <p:extLst>
       <p:ext uri="{BB962C8B-B14F-4D97-AF65-F5344CB8AC3E}">
-        <p14:creationId xmlns:p14="http://schemas.microsoft.com/office/powerpoint/2010/main" xmlns="" val="3499040603"/>
+        <p14:creationId xmlns:p14="http://schemas.microsoft.com/office/powerpoint/2010/main" val="3499040603"/>
       </p:ext>
     </p:extLst>
   </p:cSld>
   <p:clrMapOvr>
     <a:masterClrMapping/>
   </p:clrMapOvr>
+  <p:transition spd="slow">
+    <p:push dir="u"/>
+  </p:transition>
 </p:sldLayout>
 </file>
 
@@ -622,7 +631,7 @@
             <a:fld id="{E58A0508-6309-4EAB-8BA6-B85AA67F2995}" type="datetimeFigureOut">
               <a:rPr lang="en-US" smtClean="0"/>
               <a:pPr/>
-              <a:t>12/13/2015</a:t>
+              <a:t>13-Dec-15</a:t>
             </a:fld>
             <a:endParaRPr lang="en-US"/>
           </a:p>
@@ -682,13 +691,16 @@
     </p:spTree>
     <p:extLst>
       <p:ext uri="{BB962C8B-B14F-4D97-AF65-F5344CB8AC3E}">
-        <p14:creationId xmlns:p14="http://schemas.microsoft.com/office/powerpoint/2010/main" xmlns="" val="1294682803"/>
+        <p14:creationId xmlns:p14="http://schemas.microsoft.com/office/powerpoint/2010/main" val="1294682803"/>
       </p:ext>
     </p:extLst>
   </p:cSld>
   <p:clrMapOvr>
     <a:masterClrMapping/>
   </p:clrMapOvr>
+  <p:transition spd="slow">
+    <p:push dir="u"/>
+  </p:transition>
 </p:sldLayout>
 </file>
 
@@ -806,7 +818,7 @@
             <a:fld id="{E58A0508-6309-4EAB-8BA6-B85AA67F2995}" type="datetimeFigureOut">
               <a:rPr lang="en-US" smtClean="0"/>
               <a:pPr/>
-              <a:t>12/13/2015</a:t>
+              <a:t>13-Dec-15</a:t>
             </a:fld>
             <a:endParaRPr lang="en-US"/>
           </a:p>
@@ -866,13 +878,16 @@
     </p:spTree>
     <p:extLst>
       <p:ext uri="{BB962C8B-B14F-4D97-AF65-F5344CB8AC3E}">
-        <p14:creationId xmlns:p14="http://schemas.microsoft.com/office/powerpoint/2010/main" xmlns="" val="141096533"/>
+        <p14:creationId xmlns:p14="http://schemas.microsoft.com/office/powerpoint/2010/main" val="141096533"/>
       </p:ext>
     </p:extLst>
   </p:cSld>
   <p:clrMapOvr>
     <a:masterClrMapping/>
   </p:clrMapOvr>
+  <p:transition spd="slow">
+    <p:push dir="u"/>
+  </p:transition>
 </p:sldLayout>
 </file>
 
@@ -1012,7 +1027,7 @@
             <a:fld id="{E58A0508-6309-4EAB-8BA6-B85AA67F2995}" type="datetimeFigureOut">
               <a:rPr lang="en-US" smtClean="0"/>
               <a:pPr/>
-              <a:t>12/13/2015</a:t>
+              <a:t>13-Dec-15</a:t>
             </a:fld>
             <a:endParaRPr lang="en-US"/>
           </a:p>
@@ -1072,13 +1087,16 @@
     </p:spTree>
     <p:extLst>
       <p:ext uri="{BB962C8B-B14F-4D97-AF65-F5344CB8AC3E}">
-        <p14:creationId xmlns:p14="http://schemas.microsoft.com/office/powerpoint/2010/main" xmlns="" val="1790837754"/>
+        <p14:creationId xmlns:p14="http://schemas.microsoft.com/office/powerpoint/2010/main" val="1790837754"/>
       </p:ext>
     </p:extLst>
   </p:cSld>
   <p:clrMapOvr>
     <a:masterClrMapping/>
   </p:clrMapOvr>
+  <p:transition spd="slow">
+    <p:push dir="u"/>
+  </p:transition>
 </p:sldLayout>
 </file>
 
@@ -1314,7 +1332,7 @@
             <a:fld id="{E58A0508-6309-4EAB-8BA6-B85AA67F2995}" type="datetimeFigureOut">
               <a:rPr lang="en-US" smtClean="0"/>
               <a:pPr/>
-              <a:t>12/13/2015</a:t>
+              <a:t>13-Dec-15</a:t>
             </a:fld>
             <a:endParaRPr lang="en-US"/>
           </a:p>
@@ -1374,13 +1392,16 @@
     </p:spTree>
     <p:extLst>
       <p:ext uri="{BB962C8B-B14F-4D97-AF65-F5344CB8AC3E}">
-        <p14:creationId xmlns:p14="http://schemas.microsoft.com/office/powerpoint/2010/main" xmlns="" val="4294623358"/>
+        <p14:creationId xmlns:p14="http://schemas.microsoft.com/office/powerpoint/2010/main" val="4294623358"/>
       </p:ext>
     </p:extLst>
   </p:cSld>
   <p:clrMapOvr>
     <a:masterClrMapping/>
   </p:clrMapOvr>
+  <p:transition spd="slow">
+    <p:push dir="u"/>
+  </p:transition>
 </p:sldLayout>
 </file>
 
@@ -1750,7 +1771,7 @@
             <a:fld id="{E58A0508-6309-4EAB-8BA6-B85AA67F2995}" type="datetimeFigureOut">
               <a:rPr lang="en-US" smtClean="0"/>
               <a:pPr/>
-              <a:t>12/13/2015</a:t>
+              <a:t>13-Dec-15</a:t>
             </a:fld>
             <a:endParaRPr lang="en-US"/>
           </a:p>
@@ -1810,13 +1831,16 @@
     </p:spTree>
     <p:extLst>
       <p:ext uri="{BB962C8B-B14F-4D97-AF65-F5344CB8AC3E}">
-        <p14:creationId xmlns:p14="http://schemas.microsoft.com/office/powerpoint/2010/main" xmlns="" val="2177959939"/>
+        <p14:creationId xmlns:p14="http://schemas.microsoft.com/office/powerpoint/2010/main" val="2177959939"/>
       </p:ext>
     </p:extLst>
   </p:cSld>
   <p:clrMapOvr>
     <a:masterClrMapping/>
   </p:clrMapOvr>
+  <p:transition spd="slow">
+    <p:push dir="u"/>
+  </p:transition>
 </p:sldLayout>
 </file>
 
@@ -1882,7 +1906,7 @@
             <a:fld id="{E58A0508-6309-4EAB-8BA6-B85AA67F2995}" type="datetimeFigureOut">
               <a:rPr lang="en-US" smtClean="0"/>
               <a:pPr/>
-              <a:t>12/13/2015</a:t>
+              <a:t>13-Dec-15</a:t>
             </a:fld>
             <a:endParaRPr lang="en-US"/>
           </a:p>
@@ -1942,13 +1966,16 @@
     </p:spTree>
     <p:extLst>
       <p:ext uri="{BB962C8B-B14F-4D97-AF65-F5344CB8AC3E}">
-        <p14:creationId xmlns:p14="http://schemas.microsoft.com/office/powerpoint/2010/main" xmlns="" val="3647597071"/>
+        <p14:creationId xmlns:p14="http://schemas.microsoft.com/office/powerpoint/2010/main" val="3647597071"/>
       </p:ext>
     </p:extLst>
   </p:cSld>
   <p:clrMapOvr>
     <a:masterClrMapping/>
   </p:clrMapOvr>
+  <p:transition spd="slow">
+    <p:push dir="u"/>
+  </p:transition>
 </p:sldLayout>
 </file>
 
@@ -1991,7 +2018,7 @@
             <a:fld id="{E58A0508-6309-4EAB-8BA6-B85AA67F2995}" type="datetimeFigureOut">
               <a:rPr lang="en-US" smtClean="0"/>
               <a:pPr/>
-              <a:t>12/13/2015</a:t>
+              <a:t>13-Dec-15</a:t>
             </a:fld>
             <a:endParaRPr lang="en-US"/>
           </a:p>
@@ -2051,13 +2078,16 @@
     </p:spTree>
     <p:extLst>
       <p:ext uri="{BB962C8B-B14F-4D97-AF65-F5344CB8AC3E}">
-        <p14:creationId xmlns:p14="http://schemas.microsoft.com/office/powerpoint/2010/main" xmlns="" val="2326664693"/>
+        <p14:creationId xmlns:p14="http://schemas.microsoft.com/office/powerpoint/2010/main" val="2326664693"/>
       </p:ext>
     </p:extLst>
   </p:cSld>
   <p:clrMapOvr>
     <a:masterClrMapping/>
   </p:clrMapOvr>
+  <p:transition spd="slow">
+    <p:push dir="u"/>
+  </p:transition>
 </p:sldLayout>
 </file>
 
@@ -2282,7 +2312,7 @@
             <a:fld id="{E58A0508-6309-4EAB-8BA6-B85AA67F2995}" type="datetimeFigureOut">
               <a:rPr lang="en-US" smtClean="0"/>
               <a:pPr/>
-              <a:t>12/13/2015</a:t>
+              <a:t>13-Dec-15</a:t>
             </a:fld>
             <a:endParaRPr lang="en-US"/>
           </a:p>
@@ -2342,13 +2372,16 @@
     </p:spTree>
     <p:extLst>
       <p:ext uri="{BB962C8B-B14F-4D97-AF65-F5344CB8AC3E}">
-        <p14:creationId xmlns:p14="http://schemas.microsoft.com/office/powerpoint/2010/main" xmlns="" val="2153272923"/>
+        <p14:creationId xmlns:p14="http://schemas.microsoft.com/office/powerpoint/2010/main" val="2153272923"/>
       </p:ext>
     </p:extLst>
   </p:cSld>
   <p:clrMapOvr>
     <a:masterClrMapping/>
   </p:clrMapOvr>
+  <p:transition spd="slow">
+    <p:push dir="u"/>
+  </p:transition>
 </p:sldLayout>
 </file>
 
@@ -2553,7 +2586,7 @@
             <a:fld id="{E58A0508-6309-4EAB-8BA6-B85AA67F2995}" type="datetimeFigureOut">
               <a:rPr lang="en-US" smtClean="0"/>
               <a:pPr/>
-              <a:t>12/13/2015</a:t>
+              <a:t>13-Dec-15</a:t>
             </a:fld>
             <a:endParaRPr lang="en-US"/>
           </a:p>
@@ -2613,13 +2646,16 @@
     </p:spTree>
     <p:extLst>
       <p:ext uri="{BB962C8B-B14F-4D97-AF65-F5344CB8AC3E}">
-        <p14:creationId xmlns:p14="http://schemas.microsoft.com/office/powerpoint/2010/main" xmlns="" val="3765760839"/>
+        <p14:creationId xmlns:p14="http://schemas.microsoft.com/office/powerpoint/2010/main" val="3765760839"/>
       </p:ext>
     </p:extLst>
   </p:cSld>
   <p:clrMapOvr>
     <a:masterClrMapping/>
   </p:clrMapOvr>
+  <p:transition spd="slow">
+    <p:push dir="u"/>
+  </p:transition>
 </p:sldLayout>
 </file>
 
@@ -2677,14 +2713,14 @@
           <a:effectLst/>
           <a:extLst>
             <a:ext uri="{909E8E84-426E-40DD-AFC4-6F175D3DCCD1}">
-              <a14:hiddenFill xmlns:a14="http://schemas.microsoft.com/office/drawing/2010/main" xmlns="">
+              <a14:hiddenFill xmlns:a14="http://schemas.microsoft.com/office/drawing/2010/main">
                 <a:solidFill>
                   <a:schemeClr val="accent1"/>
                 </a:solidFill>
               </a14:hiddenFill>
             </a:ext>
             <a:ext uri="{91240B29-F687-4F45-9708-019B960494DF}">
-              <a14:hiddenLine xmlns:a14="http://schemas.microsoft.com/office/drawing/2010/main" xmlns="" w="9525">
+              <a14:hiddenLine xmlns:a14="http://schemas.microsoft.com/office/drawing/2010/main" w="9525">
                 <a:solidFill>
                   <a:schemeClr val="tx1"/>
                 </a:solidFill>
@@ -2694,7 +2730,7 @@
               </a14:hiddenLine>
             </a:ext>
             <a:ext uri="{AF507438-7753-43E0-B8FC-AC1667EBCBE1}">
-              <a14:hiddenEffects xmlns:a14="http://schemas.microsoft.com/office/drawing/2010/main" xmlns="">
+              <a14:hiddenEffects xmlns:a14="http://schemas.microsoft.com/office/drawing/2010/main">
                 <a:effectLst>
                   <a:outerShdw dist="35921" dir="2700000" algn="ctr" rotWithShape="0">
                     <a:schemeClr val="bg2"/>
@@ -2745,14 +2781,14 @@
           <a:effectLst/>
           <a:extLst>
             <a:ext uri="{909E8E84-426E-40DD-AFC4-6F175D3DCCD1}">
-              <a14:hiddenFill xmlns:a14="http://schemas.microsoft.com/office/drawing/2010/main" xmlns="">
+              <a14:hiddenFill xmlns:a14="http://schemas.microsoft.com/office/drawing/2010/main">
                 <a:solidFill>
                   <a:schemeClr val="accent1"/>
                 </a:solidFill>
               </a14:hiddenFill>
             </a:ext>
             <a:ext uri="{91240B29-F687-4F45-9708-019B960494DF}">
-              <a14:hiddenLine xmlns:a14="http://schemas.microsoft.com/office/drawing/2010/main" xmlns="" w="9525">
+              <a14:hiddenLine xmlns:a14="http://schemas.microsoft.com/office/drawing/2010/main" w="9525">
                 <a:solidFill>
                   <a:schemeClr val="tx1"/>
                 </a:solidFill>
@@ -2762,7 +2798,7 @@
               </a14:hiddenLine>
             </a:ext>
             <a:ext uri="{AF507438-7753-43E0-B8FC-AC1667EBCBE1}">
-              <a14:hiddenEffects xmlns:a14="http://schemas.microsoft.com/office/drawing/2010/main" xmlns="">
+              <a14:hiddenEffects xmlns:a14="http://schemas.microsoft.com/office/drawing/2010/main">
                 <a:effectLst>
                   <a:outerShdw dist="35921" dir="2700000" algn="ctr" rotWithShape="0">
                     <a:schemeClr val="bg2"/>
@@ -2841,14 +2877,14 @@
           <a:effectLst/>
           <a:extLst>
             <a:ext uri="{909E8E84-426E-40DD-AFC4-6F175D3DCCD1}">
-              <a14:hiddenFill xmlns:a14="http://schemas.microsoft.com/office/drawing/2010/main" xmlns="">
+              <a14:hiddenFill xmlns:a14="http://schemas.microsoft.com/office/drawing/2010/main">
                 <a:solidFill>
                   <a:schemeClr val="accent1"/>
                 </a:solidFill>
               </a14:hiddenFill>
             </a:ext>
             <a:ext uri="{91240B29-F687-4F45-9708-019B960494DF}">
-              <a14:hiddenLine xmlns:a14="http://schemas.microsoft.com/office/drawing/2010/main" xmlns="" w="9525">
+              <a14:hiddenLine xmlns:a14="http://schemas.microsoft.com/office/drawing/2010/main" w="9525">
                 <a:solidFill>
                   <a:schemeClr val="tx1"/>
                 </a:solidFill>
@@ -2858,7 +2894,7 @@
               </a14:hiddenLine>
             </a:ext>
             <a:ext uri="{AF507438-7753-43E0-B8FC-AC1667EBCBE1}">
-              <a14:hiddenEffects xmlns:a14="http://schemas.microsoft.com/office/drawing/2010/main" xmlns="">
+              <a14:hiddenEffects xmlns:a14="http://schemas.microsoft.com/office/drawing/2010/main">
                 <a:effectLst>
                   <a:outerShdw dist="35921" dir="2700000" algn="ctr" rotWithShape="0">
                     <a:schemeClr val="bg2"/>
@@ -2883,7 +2919,7 @@
             <a:fld id="{E58A0508-6309-4EAB-8BA6-B85AA67F2995}" type="datetimeFigureOut">
               <a:rPr lang="en-US" smtClean="0"/>
               <a:pPr/>
-              <a:t>12/13/2015</a:t>
+              <a:t>13-Dec-15</a:t>
             </a:fld>
             <a:endParaRPr lang="en-US"/>
           </a:p>
@@ -2914,14 +2950,14 @@
           <a:effectLst/>
           <a:extLst>
             <a:ext uri="{909E8E84-426E-40DD-AFC4-6F175D3DCCD1}">
-              <a14:hiddenFill xmlns:a14="http://schemas.microsoft.com/office/drawing/2010/main" xmlns="">
+              <a14:hiddenFill xmlns:a14="http://schemas.microsoft.com/office/drawing/2010/main">
                 <a:solidFill>
                   <a:schemeClr val="accent1"/>
                 </a:solidFill>
               </a14:hiddenFill>
             </a:ext>
             <a:ext uri="{91240B29-F687-4F45-9708-019B960494DF}">
-              <a14:hiddenLine xmlns:a14="http://schemas.microsoft.com/office/drawing/2010/main" xmlns="" w="9525">
+              <a14:hiddenLine xmlns:a14="http://schemas.microsoft.com/office/drawing/2010/main" w="9525">
                 <a:solidFill>
                   <a:schemeClr val="tx1"/>
                 </a:solidFill>
@@ -2931,7 +2967,7 @@
               </a14:hiddenLine>
             </a:ext>
             <a:ext uri="{AF507438-7753-43E0-B8FC-AC1667EBCBE1}">
-              <a14:hiddenEffects xmlns:a14="http://schemas.microsoft.com/office/drawing/2010/main" xmlns="">
+              <a14:hiddenEffects xmlns:a14="http://schemas.microsoft.com/office/drawing/2010/main">
                 <a:effectLst>
                   <a:outerShdw dist="35921" dir="2700000" algn="ctr" rotWithShape="0">
                     <a:schemeClr val="bg2"/>
@@ -2982,14 +3018,14 @@
           <a:effectLst/>
           <a:extLst>
             <a:ext uri="{909E8E84-426E-40DD-AFC4-6F175D3DCCD1}">
-              <a14:hiddenFill xmlns:a14="http://schemas.microsoft.com/office/drawing/2010/main" xmlns="">
+              <a14:hiddenFill xmlns:a14="http://schemas.microsoft.com/office/drawing/2010/main">
                 <a:solidFill>
                   <a:schemeClr val="accent1"/>
                 </a:solidFill>
               </a14:hiddenFill>
             </a:ext>
             <a:ext uri="{91240B29-F687-4F45-9708-019B960494DF}">
-              <a14:hiddenLine xmlns:a14="http://schemas.microsoft.com/office/drawing/2010/main" xmlns="" w="9525">
+              <a14:hiddenLine xmlns:a14="http://schemas.microsoft.com/office/drawing/2010/main" w="9525">
                 <a:solidFill>
                   <a:schemeClr val="tx1"/>
                 </a:solidFill>
@@ -2999,7 +3035,7 @@
               </a14:hiddenLine>
             </a:ext>
             <a:ext uri="{AF507438-7753-43E0-B8FC-AC1667EBCBE1}">
-              <a14:hiddenEffects xmlns:a14="http://schemas.microsoft.com/office/drawing/2010/main" xmlns="">
+              <a14:hiddenEffects xmlns:a14="http://schemas.microsoft.com/office/drawing/2010/main">
                 <a:effectLst>
                   <a:outerShdw dist="35921" dir="2700000" algn="ctr" rotWithShape="0">
                     <a:schemeClr val="bg2"/>
@@ -3046,6 +3082,9 @@
     <p:sldLayoutId id="2147483682" r:id="rId10"/>
     <p:sldLayoutId id="2147483683" r:id="rId11"/>
   </p:sldLayoutIdLst>
+  <p:transition spd="slow">
+    <p:push dir="u"/>
+  </p:transition>
   <p:txStyles>
     <p:titleStyle>
       <a:lvl1pPr algn="ctr" rtl="0" eaLnBrk="1" fontAlgn="base" hangingPunct="1">
@@ -3472,7 +3511,13 @@
               <a:rPr lang="sr-Latn-RS" dirty="0" smtClean="0">
                 <a:latin typeface="Calibri" pitchFamily="34" charset="0"/>
               </a:rPr>
-              <a:t>Semantička klasifikacija rečenica</a:t>
+              <a:t>Semantička klasifikacija </a:t>
+            </a:r>
+            <a:r>
+              <a:rPr lang="sr-Latn-RS" dirty="0" smtClean="0">
+                <a:latin typeface="Calibri" pitchFamily="34" charset="0"/>
+              </a:rPr>
+              <a:t>rečenica</a:t>
             </a:r>
             <a:endParaRPr lang="en-US" dirty="0">
               <a:latin typeface="Calibri" pitchFamily="34" charset="0"/>
@@ -3492,17 +3537,13 @@
         </p:nvSpPr>
         <p:spPr>
           <a:xfrm>
-            <a:off x="976745" y="3886200"/>
-            <a:ext cx="5957455" cy="1828800"/>
+            <a:off x="976744" y="3886200"/>
+            <a:ext cx="7862456" cy="1828800"/>
           </a:xfrm>
         </p:spPr>
         <p:txBody>
           <a:bodyPr/>
           <a:lstStyle/>
-          <a:p>
-            <a:pPr algn="l"/>
-            <a:endParaRPr lang="sr-Latn-RS" sz="2400" dirty="0" smtClean="0"/>
-          </a:p>
           <a:p>
             <a:pPr algn="l"/>
             <a:endParaRPr lang="sr-Latn-RS" sz="2400" dirty="0"/>
@@ -3597,13 +3638,16 @@
     </p:spTree>
     <p:extLst>
       <p:ext uri="{BB962C8B-B14F-4D97-AF65-F5344CB8AC3E}">
-        <p14:creationId xmlns:p14="http://schemas.microsoft.com/office/powerpoint/2010/main" xmlns="" val="2329006346"/>
+        <p14:creationId xmlns:p14="http://schemas.microsoft.com/office/powerpoint/2010/main" val="2329006346"/>
       </p:ext>
     </p:extLst>
   </p:cSld>
   <p:clrMapOvr>
     <a:masterClrMapping/>
   </p:clrMapOvr>
+  <p:transition spd="slow">
+    <p:push dir="u"/>
+  </p:transition>
   <p:timing>
     <p:tnLst>
       <p:par>
@@ -3711,13 +3755,16 @@
     </p:spTree>
     <p:extLst>
       <p:ext uri="{BB962C8B-B14F-4D97-AF65-F5344CB8AC3E}">
-        <p14:creationId xmlns:p14="http://schemas.microsoft.com/office/powerpoint/2010/main" xmlns="" val="2675446113"/>
+        <p14:creationId xmlns:p14="http://schemas.microsoft.com/office/powerpoint/2010/main" val="2675446113"/>
       </p:ext>
     </p:extLst>
   </p:cSld>
   <p:clrMapOvr>
     <a:masterClrMapping/>
   </p:clrMapOvr>
+  <p:transition spd="slow">
+    <p:push dir="u"/>
+  </p:transition>
   <p:timing>
     <p:tnLst>
       <p:par>
@@ -3796,13 +3843,7 @@
               <a:rPr lang="sr-Latn-RS" dirty="0" smtClean="0">
                 <a:latin typeface="Calibri" pitchFamily="34" charset="0"/>
               </a:rPr>
-              <a:t>Preuzimanje željenog sadržaja iz teksta, bez njegovog kompletnog čitanja</a:t>
-            </a:r>
-            <a:r>
-              <a:rPr lang="sr-Latn-RS" dirty="0" smtClean="0">
-                <a:latin typeface="Calibri" pitchFamily="34" charset="0"/>
-              </a:rPr>
-              <a:t>.</a:t>
+              <a:t>Preuzimanje željenog sadržaja iz teksta, bez njegovog kompletnog čitanja.</a:t>
             </a:r>
             <a:endParaRPr lang="sr-Latn-RS" dirty="0">
               <a:latin typeface="Calibri" pitchFamily="34" charset="0"/>
@@ -3815,22 +3856,29 @@
               </a:rPr>
               <a:t>Semantička analiza teksta kao takva.</a:t>
             </a:r>
-            <a:endParaRPr lang="sr-Latn-RS" dirty="0" smtClean="0">
-              <a:latin typeface="Calibri" pitchFamily="34" charset="0"/>
-            </a:endParaRPr>
           </a:p>
         </p:txBody>
       </p:sp>
     </p:spTree>
     <p:extLst>
       <p:ext uri="{BB962C8B-B14F-4D97-AF65-F5344CB8AC3E}">
-        <p14:creationId xmlns:p14="http://schemas.microsoft.com/office/powerpoint/2010/main" xmlns="" val="2572676877"/>
+        <p14:creationId xmlns:p14="http://schemas.microsoft.com/office/powerpoint/2010/main" val="2572676877"/>
       </p:ext>
     </p:extLst>
   </p:cSld>
   <p:clrMapOvr>
     <a:masterClrMapping/>
   </p:clrMapOvr>
+  <p:transition spd="slow">
+    <p:push dir="u"/>
+  </p:transition>
+  <p:timing>
+    <p:tnLst>
+      <p:par>
+        <p:cTn id="1" dur="indefinite" restart="never" nodeType="tmRoot"/>
+      </p:par>
+    </p:tnLst>
+  </p:timing>
 </p:sld>
 </file>
 
@@ -3867,10 +3915,14 @@
           <a:lstStyle/>
           <a:p>
             <a:r>
-              <a:rPr lang="sr-Latn-RS" dirty="0" smtClean="0"/>
+              <a:rPr lang="sr-Latn-RS" dirty="0" smtClean="0">
+                <a:latin typeface="Calibri" pitchFamily="34" charset="0"/>
+              </a:rPr>
               <a:t>Slična rešenja</a:t>
             </a:r>
-            <a:endParaRPr lang="en-US" dirty="0"/>
+            <a:endParaRPr lang="en-US" dirty="0">
+              <a:latin typeface="Calibri" pitchFamily="34" charset="0"/>
+            </a:endParaRPr>
           </a:p>
         </p:txBody>
       </p:sp>
@@ -3895,28 +3947,38 @@
           <a:lstStyle/>
           <a:p>
             <a:r>
-              <a:rPr lang="sr-Latn-RS" dirty="0" smtClean="0"/>
+              <a:rPr lang="sr-Latn-RS" dirty="0" smtClean="0">
+                <a:latin typeface="Calibri" pitchFamily="34" charset="0"/>
+              </a:rPr>
               <a:t>Naive Bayes Classificator</a:t>
             </a:r>
           </a:p>
           <a:p>
             <a:r>
-              <a:rPr lang="sr-Latn-RS" dirty="0" smtClean="0"/>
+              <a:rPr lang="sr-Latn-RS" dirty="0" smtClean="0">
+                <a:latin typeface="Calibri" pitchFamily="34" charset="0"/>
+              </a:rPr>
               <a:t>Random Decision Forests</a:t>
             </a:r>
           </a:p>
           <a:p>
             <a:r>
-              <a:rPr lang="sr-Latn-RS" dirty="0" smtClean="0"/>
+              <a:rPr lang="sr-Latn-RS" dirty="0" smtClean="0">
+                <a:latin typeface="Calibri" pitchFamily="34" charset="0"/>
+              </a:rPr>
               <a:t>Support Vector Machines</a:t>
             </a:r>
           </a:p>
           <a:p>
             <a:r>
-              <a:rPr lang="sr-Latn-RS" dirty="0" smtClean="0"/>
+              <a:rPr lang="sr-Latn-RS" dirty="0" smtClean="0">
+                <a:latin typeface="Calibri" pitchFamily="34" charset="0"/>
+              </a:rPr>
               <a:t>Convolutional Neural Networks</a:t>
             </a:r>
-            <a:endParaRPr lang="en-US" dirty="0"/>
+            <a:endParaRPr lang="en-US" dirty="0">
+              <a:latin typeface="Calibri" pitchFamily="34" charset="0"/>
+            </a:endParaRPr>
           </a:p>
         </p:txBody>
       </p:sp>
@@ -3925,6 +3987,16 @@
   <p:clrMapOvr>
     <a:masterClrMapping/>
   </p:clrMapOvr>
+  <p:transition spd="slow">
+    <p:push dir="u"/>
+  </p:transition>
+  <p:timing>
+    <p:tnLst>
+      <p:par>
+        <p:cTn id="1" dur="indefinite" restart="never" nodeType="tmRoot"/>
+      </p:par>
+    </p:tnLst>
+  </p:timing>
 </p:sld>
 </file>
 
@@ -3961,29 +4033,60 @@
           <a:lstStyle/>
           <a:p>
             <a:r>
+              <a:rPr lang="sr-Latn-RS" dirty="0" smtClean="0">
+                <a:latin typeface="Calibri" pitchFamily="34" charset="0"/>
+              </a:rPr>
+              <a:t>Data Set</a:t>
+            </a:r>
+            <a:endParaRPr lang="en-US" dirty="0">
+              <a:latin typeface="Calibri" pitchFamily="34" charset="0"/>
+            </a:endParaRPr>
+          </a:p>
+        </p:txBody>
+      </p:sp>
+      <p:sp>
+        <p:nvSpPr>
+          <p:cNvPr id="3" name="Content Placeholder 2"/>
+          <p:cNvSpPr>
+            <a:spLocks noGrp="1"/>
+          </p:cNvSpPr>
+          <p:nvPr>
+            <p:ph idx="1"/>
+          </p:nvPr>
+        </p:nvSpPr>
+        <p:spPr>
+          <a:xfrm>
+            <a:off x="762000" y="1600200"/>
+            <a:ext cx="7924800" cy="4525963"/>
+          </a:xfrm>
+        </p:spPr>
+        <p:txBody>
+          <a:bodyPr/>
+          <a:lstStyle/>
+          <a:p>
+            <a:r>
               <a:rPr lang="sr-Latn-RS" dirty="0" smtClean="0"/>
-              <a:t>Data Set</a:t>
+              <a:t>„Sentence Classification Data Set“ – UCI Machine Learning Repository</a:t>
+            </a:r>
+          </a:p>
+          <a:p>
+            <a:r>
+              <a:rPr lang="sr-Latn-RS" dirty="0" smtClean="0"/>
+              <a:t>90 članaka iz 3 oblasti </a:t>
+            </a:r>
+          </a:p>
+          <a:p>
+            <a:r>
+              <a:rPr lang="sr-Latn-RS" dirty="0" smtClean="0"/>
+              <a:t>Trening set – 80% (2500 rečenica)</a:t>
+            </a:r>
+          </a:p>
+          <a:p>
+            <a:r>
+              <a:rPr lang="sr-Latn-RS" dirty="0" smtClean="0"/>
+              <a:t>Test set – 20% (617 rečenica)</a:t>
             </a:r>
             <a:endParaRPr lang="en-US" dirty="0"/>
-          </a:p>
-        </p:txBody>
-      </p:sp>
-      <p:sp>
-        <p:nvSpPr>
-          <p:cNvPr id="3" name="Content Placeholder 2"/>
-          <p:cNvSpPr>
-            <a:spLocks noGrp="1"/>
-          </p:cNvSpPr>
-          <p:nvPr>
-            <p:ph idx="1"/>
-          </p:nvPr>
-        </p:nvSpPr>
-        <p:spPr/>
-        <p:txBody>
-          <a:bodyPr/>
-          <a:lstStyle/>
-          <a:p>
-            <a:endParaRPr lang="en-US"/>
           </a:p>
         </p:txBody>
       </p:sp>
@@ -3992,6 +4095,16 @@
   <p:clrMapOvr>
     <a:masterClrMapping/>
   </p:clrMapOvr>
+  <p:transition spd="slow">
+    <p:push dir="u"/>
+  </p:transition>
+  <p:timing>
+    <p:tnLst>
+      <p:par>
+        <p:cTn id="1" dur="indefinite" restart="never" nodeType="tmRoot"/>
+      </p:par>
+    </p:tnLst>
+  </p:timing>
 </p:sld>
 </file>
 
@@ -4012,6 +4125,378 @@
           <a:chExt cx="0" cy="0"/>
         </a:xfrm>
       </p:grpSpPr>
+      <p:pic>
+        <p:nvPicPr>
+          <p:cNvPr id="1026" name="Picture 2"/>
+          <p:cNvPicPr>
+            <a:picLocks noChangeAspect="1" noChangeArrowheads="1"/>
+          </p:cNvPicPr>
+          <p:nvPr/>
+        </p:nvPicPr>
+        <p:blipFill>
+          <a:blip r:embed="rId2">
+            <a:extLst>
+              <a:ext uri="{28A0092B-C50C-407E-A947-70E740481C1C}">
+                <a14:useLocalDpi xmlns:a14="http://schemas.microsoft.com/office/drawing/2010/main" val="0"/>
+              </a:ext>
+            </a:extLst>
+          </a:blip>
+          <a:srcRect/>
+          <a:stretch>
+            <a:fillRect/>
+          </a:stretch>
+        </p:blipFill>
+        <p:spPr bwMode="auto">
+          <a:xfrm>
+            <a:off x="1371600" y="762000"/>
+            <a:ext cx="6586539" cy="4017259"/>
+          </a:xfrm>
+          <a:prstGeom prst="rect">
+            <a:avLst/>
+          </a:prstGeom>
+          <a:ln w="38100" cap="sq">
+            <a:solidFill>
+              <a:srgbClr val="000000"/>
+            </a:solidFill>
+            <a:prstDash val="solid"/>
+            <a:miter lim="800000"/>
+          </a:ln>
+          <a:effectLst>
+            <a:outerShdw blurRad="50800" dist="38100" dir="2700000" algn="tl" rotWithShape="0">
+              <a:srgbClr val="000000">
+                <a:alpha val="43000"/>
+              </a:srgbClr>
+            </a:outerShdw>
+          </a:effectLst>
+          <a:extLst>
+            <a:ext uri="{909E8E84-426E-40DD-AFC4-6F175D3DCCD1}">
+              <a14:hiddenFill xmlns:a14="http://schemas.microsoft.com/office/drawing/2010/main">
+                <a:solidFill>
+                  <a:schemeClr val="accent1"/>
+                </a:solidFill>
+              </a14:hiddenFill>
+            </a:ext>
+            <a:ext uri="{91240B29-F687-4F45-9708-019B960494DF}">
+              <a14:hiddenLine xmlns:a14="http://schemas.microsoft.com/office/drawing/2010/main" w="9525">
+                <a:solidFill>
+                  <a:schemeClr val="tx1"/>
+                </a:solidFill>
+                <a:miter lim="800000"/>
+                <a:headEnd/>
+                <a:tailEnd/>
+              </a14:hiddenLine>
+            </a:ext>
+            <a:ext uri="{AF507438-7753-43E0-B8FC-AC1667EBCBE1}">
+              <a14:hiddenEffects xmlns:a14="http://schemas.microsoft.com/office/drawing/2010/main">
+                <a:effectLst>
+                  <a:outerShdw dist="35921" dir="2700000" algn="ctr" rotWithShape="0">
+                    <a:schemeClr val="bg2"/>
+                  </a:outerShdw>
+                </a:effectLst>
+              </a14:hiddenEffects>
+            </a:ext>
+          </a:extLst>
+        </p:spPr>
+      </p:pic>
+    </p:spTree>
+    <p:extLst>
+      <p:ext uri="{BB962C8B-B14F-4D97-AF65-F5344CB8AC3E}">
+        <p14:creationId xmlns:p14="http://schemas.microsoft.com/office/powerpoint/2010/main" val="2125068340"/>
+      </p:ext>
+    </p:extLst>
+  </p:cSld>
+  <p:clrMapOvr>
+    <a:masterClrMapping/>
+  </p:clrMapOvr>
+  <p:transition spd="slow">
+    <p:push dir="u"/>
+  </p:transition>
+  <p:timing>
+    <p:tnLst>
+      <p:par>
+        <p:cTn id="1" dur="indefinite" restart="never" nodeType="tmRoot"/>
+      </p:par>
+    </p:tnLst>
+  </p:timing>
+</p:sld>
+</file>
+
+<file path=ppt/slides/slide7.xml><?xml version="1.0" encoding="utf-8"?>
+<p:sld xmlns:a="http://schemas.openxmlformats.org/drawingml/2006/main" xmlns:r="http://schemas.openxmlformats.org/officeDocument/2006/relationships" xmlns:p="http://schemas.openxmlformats.org/presentationml/2006/main">
+  <p:cSld>
+    <p:spTree>
+      <p:nvGrpSpPr>
+        <p:cNvPr id="1" name=""/>
+        <p:cNvGrpSpPr/>
+        <p:nvPr/>
+      </p:nvGrpSpPr>
+      <p:grpSpPr>
+        <a:xfrm>
+          <a:off x="0" y="0"/>
+          <a:ext cx="0" cy="0"/>
+          <a:chOff x="0" y="0"/>
+          <a:chExt cx="0" cy="0"/>
+        </a:xfrm>
+      </p:grpSpPr>
+      <p:pic>
+        <p:nvPicPr>
+          <p:cNvPr id="2051" name="Picture 3"/>
+          <p:cNvPicPr>
+            <a:picLocks noChangeAspect="1" noChangeArrowheads="1"/>
+          </p:cNvPicPr>
+          <p:nvPr/>
+        </p:nvPicPr>
+        <p:blipFill>
+          <a:blip r:embed="rId2">
+            <a:extLst>
+              <a:ext uri="{28A0092B-C50C-407E-A947-70E740481C1C}">
+                <a14:useLocalDpi xmlns:a14="http://schemas.microsoft.com/office/drawing/2010/main" val="0"/>
+              </a:ext>
+            </a:extLst>
+          </a:blip>
+          <a:srcRect/>
+          <a:stretch>
+            <a:fillRect/>
+          </a:stretch>
+        </p:blipFill>
+        <p:spPr bwMode="auto">
+          <a:xfrm>
+            <a:off x="3124200" y="685799"/>
+            <a:ext cx="1657350" cy="2686050"/>
+          </a:xfrm>
+          <a:prstGeom prst="rect">
+            <a:avLst/>
+          </a:prstGeom>
+          <a:ln w="38100" cap="sq">
+            <a:solidFill>
+              <a:srgbClr val="000000"/>
+            </a:solidFill>
+            <a:prstDash val="solid"/>
+            <a:miter lim="800000"/>
+          </a:ln>
+          <a:effectLst>
+            <a:outerShdw blurRad="50800" dist="38100" dir="2700000" algn="tl" rotWithShape="0">
+              <a:srgbClr val="000000">
+                <a:alpha val="43000"/>
+              </a:srgbClr>
+            </a:outerShdw>
+          </a:effectLst>
+          <a:extLst>
+            <a:ext uri="{909E8E84-426E-40DD-AFC4-6F175D3DCCD1}">
+              <a14:hiddenFill xmlns:a14="http://schemas.microsoft.com/office/drawing/2010/main">
+                <a:solidFill>
+                  <a:schemeClr val="accent1"/>
+                </a:solidFill>
+              </a14:hiddenFill>
+            </a:ext>
+            <a:ext uri="{91240B29-F687-4F45-9708-019B960494DF}">
+              <a14:hiddenLine xmlns:a14="http://schemas.microsoft.com/office/drawing/2010/main" w="9525">
+                <a:solidFill>
+                  <a:schemeClr val="tx1"/>
+                </a:solidFill>
+                <a:miter lim="800000"/>
+                <a:headEnd/>
+                <a:tailEnd/>
+              </a14:hiddenLine>
+            </a:ext>
+            <a:ext uri="{AF507438-7753-43E0-B8FC-AC1667EBCBE1}">
+              <a14:hiddenEffects xmlns:a14="http://schemas.microsoft.com/office/drawing/2010/main">
+                <a:effectLst>
+                  <a:outerShdw dist="35921" dir="2700000" algn="ctr" rotWithShape="0">
+                    <a:schemeClr val="bg2"/>
+                  </a:outerShdw>
+                </a:effectLst>
+              </a14:hiddenEffects>
+            </a:ext>
+          </a:extLst>
+        </p:spPr>
+      </p:pic>
+      <p:pic>
+        <p:nvPicPr>
+          <p:cNvPr id="2052" name="Picture 4"/>
+          <p:cNvPicPr>
+            <a:picLocks noChangeAspect="1" noChangeArrowheads="1"/>
+          </p:cNvPicPr>
+          <p:nvPr/>
+        </p:nvPicPr>
+        <p:blipFill>
+          <a:blip r:embed="rId3">
+            <a:extLst>
+              <a:ext uri="{28A0092B-C50C-407E-A947-70E740481C1C}">
+                <a14:useLocalDpi xmlns:a14="http://schemas.microsoft.com/office/drawing/2010/main" val="0"/>
+              </a:ext>
+            </a:extLst>
+          </a:blip>
+          <a:srcRect/>
+          <a:stretch>
+            <a:fillRect/>
+          </a:stretch>
+        </p:blipFill>
+        <p:spPr bwMode="auto">
+          <a:xfrm>
+            <a:off x="914400" y="685799"/>
+            <a:ext cx="1724025" cy="5095875"/>
+          </a:xfrm>
+          <a:prstGeom prst="rect">
+            <a:avLst/>
+          </a:prstGeom>
+          <a:ln w="38100" cap="sq">
+            <a:solidFill>
+              <a:srgbClr val="000000"/>
+            </a:solidFill>
+            <a:prstDash val="solid"/>
+            <a:miter lim="800000"/>
+          </a:ln>
+          <a:effectLst>
+            <a:outerShdw blurRad="50800" dist="38100" dir="2700000" algn="tl" rotWithShape="0">
+              <a:srgbClr val="000000">
+                <a:alpha val="43000"/>
+              </a:srgbClr>
+            </a:outerShdw>
+          </a:effectLst>
+          <a:extLst>
+            <a:ext uri="{909E8E84-426E-40DD-AFC4-6F175D3DCCD1}">
+              <a14:hiddenFill xmlns:a14="http://schemas.microsoft.com/office/drawing/2010/main">
+                <a:solidFill>
+                  <a:schemeClr val="accent1"/>
+                </a:solidFill>
+              </a14:hiddenFill>
+            </a:ext>
+            <a:ext uri="{91240B29-F687-4F45-9708-019B960494DF}">
+              <a14:hiddenLine xmlns:a14="http://schemas.microsoft.com/office/drawing/2010/main" w="9525">
+                <a:solidFill>
+                  <a:schemeClr val="tx1"/>
+                </a:solidFill>
+                <a:miter lim="800000"/>
+                <a:headEnd/>
+                <a:tailEnd/>
+              </a14:hiddenLine>
+            </a:ext>
+            <a:ext uri="{AF507438-7753-43E0-B8FC-AC1667EBCBE1}">
+              <a14:hiddenEffects xmlns:a14="http://schemas.microsoft.com/office/drawing/2010/main">
+                <a:effectLst>
+                  <a:outerShdw dist="35921" dir="2700000" algn="ctr" rotWithShape="0">
+                    <a:schemeClr val="bg2"/>
+                  </a:outerShdw>
+                </a:effectLst>
+              </a14:hiddenEffects>
+            </a:ext>
+          </a:extLst>
+        </p:spPr>
+      </p:pic>
+      <p:pic>
+        <p:nvPicPr>
+          <p:cNvPr id="2053" name="Picture 5"/>
+          <p:cNvPicPr>
+            <a:picLocks noChangeAspect="1" noChangeArrowheads="1"/>
+          </p:cNvPicPr>
+          <p:nvPr/>
+        </p:nvPicPr>
+        <p:blipFill>
+          <a:blip r:embed="rId4">
+            <a:extLst>
+              <a:ext uri="{28A0092B-C50C-407E-A947-70E740481C1C}">
+                <a14:useLocalDpi xmlns:a14="http://schemas.microsoft.com/office/drawing/2010/main" val="0"/>
+              </a:ext>
+            </a:extLst>
+          </a:blip>
+          <a:srcRect/>
+          <a:stretch>
+            <a:fillRect/>
+          </a:stretch>
+        </p:blipFill>
+        <p:spPr bwMode="auto">
+          <a:xfrm>
+            <a:off x="5334000" y="685799"/>
+            <a:ext cx="1543050" cy="4686300"/>
+          </a:xfrm>
+          <a:prstGeom prst="rect">
+            <a:avLst/>
+          </a:prstGeom>
+          <a:ln w="38100" cap="sq">
+            <a:solidFill>
+              <a:srgbClr val="000000"/>
+            </a:solidFill>
+            <a:prstDash val="solid"/>
+            <a:miter lim="800000"/>
+          </a:ln>
+          <a:effectLst>
+            <a:outerShdw blurRad="50800" dist="38100" dir="2700000" algn="tl" rotWithShape="0">
+              <a:srgbClr val="000000">
+                <a:alpha val="43000"/>
+              </a:srgbClr>
+            </a:outerShdw>
+          </a:effectLst>
+          <a:extLst>
+            <a:ext uri="{909E8E84-426E-40DD-AFC4-6F175D3DCCD1}">
+              <a14:hiddenFill xmlns:a14="http://schemas.microsoft.com/office/drawing/2010/main">
+                <a:solidFill>
+                  <a:schemeClr val="accent1"/>
+                </a:solidFill>
+              </a14:hiddenFill>
+            </a:ext>
+            <a:ext uri="{91240B29-F687-4F45-9708-019B960494DF}">
+              <a14:hiddenLine xmlns:a14="http://schemas.microsoft.com/office/drawing/2010/main" w="9525">
+                <a:solidFill>
+                  <a:schemeClr val="tx1"/>
+                </a:solidFill>
+                <a:miter lim="800000"/>
+                <a:headEnd/>
+                <a:tailEnd/>
+              </a14:hiddenLine>
+            </a:ext>
+            <a:ext uri="{AF507438-7753-43E0-B8FC-AC1667EBCBE1}">
+              <a14:hiddenEffects xmlns:a14="http://schemas.microsoft.com/office/drawing/2010/main">
+                <a:effectLst>
+                  <a:outerShdw dist="35921" dir="2700000" algn="ctr" rotWithShape="0">
+                    <a:schemeClr val="bg2"/>
+                  </a:outerShdw>
+                </a:effectLst>
+              </a14:hiddenEffects>
+            </a:ext>
+          </a:extLst>
+        </p:spPr>
+      </p:pic>
+    </p:spTree>
+    <p:extLst>
+      <p:ext uri="{BB962C8B-B14F-4D97-AF65-F5344CB8AC3E}">
+        <p14:creationId xmlns:p14="http://schemas.microsoft.com/office/powerpoint/2010/main" val="4126158934"/>
+      </p:ext>
+    </p:extLst>
+  </p:cSld>
+  <p:clrMapOvr>
+    <a:masterClrMapping/>
+  </p:clrMapOvr>
+  <p:transition spd="slow">
+    <p:push dir="u"/>
+  </p:transition>
+  <p:timing>
+    <p:tnLst>
+      <p:par>
+        <p:cTn id="1" dur="indefinite" restart="never" nodeType="tmRoot"/>
+      </p:par>
+    </p:tnLst>
+  </p:timing>
+</p:sld>
+</file>
+
+<file path=ppt/slides/slide8.xml><?xml version="1.0" encoding="utf-8"?>
+<p:sld xmlns:a="http://schemas.openxmlformats.org/drawingml/2006/main" xmlns:r="http://schemas.openxmlformats.org/officeDocument/2006/relationships" xmlns:p="http://schemas.openxmlformats.org/presentationml/2006/main">
+  <p:cSld>
+    <p:spTree>
+      <p:nvGrpSpPr>
+        <p:cNvPr id="1" name=""/>
+        <p:cNvGrpSpPr/>
+        <p:nvPr/>
+      </p:nvGrpSpPr>
+      <p:grpSpPr>
+        <a:xfrm>
+          <a:off x="0" y="0"/>
+          <a:ext cx="0" cy="0"/>
+          <a:chOff x="0" y="0"/>
+          <a:chExt cx="0" cy="0"/>
+        </a:xfrm>
+      </p:grpSpPr>
       <p:sp>
         <p:nvSpPr>
           <p:cNvPr id="2" name="Title 1"/>
@@ -4028,10 +4513,14 @@
           <a:lstStyle/>
           <a:p>
             <a:r>
-              <a:rPr lang="sr-Latn-RS" dirty="0" smtClean="0"/>
+              <a:rPr lang="sr-Latn-RS" dirty="0" smtClean="0">
+                <a:latin typeface="Calibri" pitchFamily="34" charset="0"/>
+              </a:rPr>
               <a:t>Implementacija</a:t>
             </a:r>
-            <a:endParaRPr lang="en-US" dirty="0"/>
+            <a:endParaRPr lang="en-US" dirty="0">
+              <a:latin typeface="Calibri" pitchFamily="34" charset="0"/>
+            </a:endParaRPr>
           </a:p>
         </p:txBody>
       </p:sp>
@@ -4056,17 +4545,23 @@
           <a:lstStyle/>
           <a:p>
             <a:r>
-              <a:rPr lang="en-US" dirty="0" smtClean="0"/>
+              <a:rPr lang="en-US" dirty="0" smtClean="0">
+                <a:latin typeface="Calibri" pitchFamily="34" charset="0"/>
+              </a:rPr>
               <a:t>W</a:t>
             </a:r>
             <a:r>
-              <a:rPr lang="sr-Latn-RS" dirty="0" smtClean="0"/>
+              <a:rPr lang="sr-Latn-RS" dirty="0" smtClean="0">
+                <a:latin typeface="Calibri" pitchFamily="34" charset="0"/>
+              </a:rPr>
               <a:t>ord2vec</a:t>
             </a:r>
           </a:p>
           <a:p>
             <a:r>
-              <a:rPr lang="sr-Latn-RS" dirty="0" smtClean="0"/>
+              <a:rPr lang="sr-Latn-RS" dirty="0" smtClean="0">
+                <a:latin typeface="Calibri" pitchFamily="34" charset="0"/>
+              </a:rPr>
               <a:t>CNN</a:t>
             </a:r>
           </a:p>
@@ -4083,6 +4578,128 @@
   <p:clrMapOvr>
     <a:masterClrMapping/>
   </p:clrMapOvr>
+  <p:transition spd="slow">
+    <p:push dir="u"/>
+  </p:transition>
+  <p:timing>
+    <p:tnLst>
+      <p:par>
+        <p:cTn id="1" dur="indefinite" restart="never" nodeType="tmRoot"/>
+      </p:par>
+    </p:tnLst>
+  </p:timing>
+</p:sld>
+</file>
+
+<file path=ppt/slides/slide9.xml><?xml version="1.0" encoding="utf-8"?>
+<p:sld xmlns:a="http://schemas.openxmlformats.org/drawingml/2006/main" xmlns:r="http://schemas.openxmlformats.org/officeDocument/2006/relationships" xmlns:p="http://schemas.openxmlformats.org/presentationml/2006/main">
+  <p:cSld>
+    <p:spTree>
+      <p:nvGrpSpPr>
+        <p:cNvPr id="1" name=""/>
+        <p:cNvGrpSpPr/>
+        <p:nvPr/>
+      </p:nvGrpSpPr>
+      <p:grpSpPr>
+        <a:xfrm>
+          <a:off x="0" y="0"/>
+          <a:ext cx="0" cy="0"/>
+          <a:chOff x="0" y="0"/>
+          <a:chExt cx="0" cy="0"/>
+        </a:xfrm>
+      </p:grpSpPr>
+      <p:sp>
+        <p:nvSpPr>
+          <p:cNvPr id="2" name="Title 1"/>
+          <p:cNvSpPr>
+            <a:spLocks noGrp="1"/>
+          </p:cNvSpPr>
+          <p:nvPr>
+            <p:ph type="title"/>
+          </p:nvPr>
+        </p:nvSpPr>
+        <p:spPr/>
+        <p:txBody>
+          <a:bodyPr/>
+          <a:lstStyle/>
+          <a:p>
+            <a:r>
+              <a:rPr lang="sr-Latn-RS" dirty="0" smtClean="0">
+                <a:latin typeface="Calibri" pitchFamily="34" charset="0"/>
+              </a:rPr>
+              <a:t>Više informacija</a:t>
+            </a:r>
+            <a:endParaRPr lang="en-US" dirty="0">
+              <a:latin typeface="Calibri" pitchFamily="34" charset="0"/>
+            </a:endParaRPr>
+          </a:p>
+        </p:txBody>
+      </p:sp>
+      <p:sp>
+        <p:nvSpPr>
+          <p:cNvPr id="3" name="Content Placeholder 2"/>
+          <p:cNvSpPr>
+            <a:spLocks noGrp="1"/>
+          </p:cNvSpPr>
+          <p:nvPr>
+            <p:ph idx="1"/>
+          </p:nvPr>
+        </p:nvSpPr>
+        <p:spPr>
+          <a:xfrm>
+            <a:off x="685800" y="1600200"/>
+            <a:ext cx="8001000" cy="4525963"/>
+          </a:xfrm>
+        </p:spPr>
+        <p:txBody>
+          <a:bodyPr/>
+          <a:lstStyle/>
+          <a:p>
+            <a:pPr marL="0" indent="0">
+              <a:buNone/>
+            </a:pPr>
+            <a:endParaRPr lang="sr-Latn-RS" sz="4400" dirty="0" smtClean="0">
+              <a:latin typeface="Calibri" pitchFamily="34" charset="0"/>
+              <a:hlinkClick r:id="rId2"/>
+            </a:endParaRPr>
+          </a:p>
+          <a:p>
+            <a:pPr marL="0" indent="0" algn="ctr">
+              <a:buNone/>
+            </a:pPr>
+            <a:r>
+              <a:rPr lang="en-US" sz="4400" dirty="0" smtClean="0">
+                <a:latin typeface="Calibri" pitchFamily="34" charset="0"/>
+                <a:hlinkClick r:id="rId2"/>
+              </a:rPr>
+              <a:t>https://github.com/vdragan1993/sentence-classification</a:t>
+            </a:r>
+            <a:endParaRPr lang="en-US" sz="4400" dirty="0">
+              <a:latin typeface="Calibri" pitchFamily="34" charset="0"/>
+            </a:endParaRPr>
+          </a:p>
+        </p:txBody>
+      </p:sp>
+    </p:spTree>
+    <p:extLst>
+      <p:ext uri="{BB962C8B-B14F-4D97-AF65-F5344CB8AC3E}">
+        <p14:creationId xmlns:p14="http://schemas.microsoft.com/office/powerpoint/2010/main" val="1646313305"/>
+      </p:ext>
+    </p:extLst>
+  </p:cSld>
+  <p:clrMapOvr>
+    <a:masterClrMapping/>
+  </p:clrMapOvr>
+  <p:transition spd="slow">
+    <p:push dir="u"/>
+  </p:transition>
+  <p:timing>
+    <p:tnLst>
+      <p:par>
+        <p:cTn id="1" dur="indefinite" restart="never" nodeType="tmRoot"/>
+      </p:par>
+    </p:tnLst>
+  </p:timing>
 </p:sld>
 </file>
 

</xml_diff>

<commit_message>
Added some pictures for Word2Vec. I still have to read about CNN and insert some pictures.
</commit_message>
<xml_diff>
--- a/semantic_classification_ppt.pptx
+++ b/semantic_classification_ppt.pptx
@@ -247,7 +247,7 @@
             <a:fld id="{E58A0508-6309-4EAB-8BA6-B85AA67F2995}" type="datetimeFigureOut">
               <a:rPr lang="en-US" smtClean="0"/>
               <a:pPr/>
-              <a:t>13-Dec-15</a:t>
+              <a:t>12/14/2015</a:t>
             </a:fld>
             <a:endParaRPr lang="en-US"/>
           </a:p>
@@ -307,7 +307,7 @@
     </p:spTree>
     <p:extLst>
       <p:ext uri="{BB962C8B-B14F-4D97-AF65-F5344CB8AC3E}">
-        <p14:creationId xmlns:p14="http://schemas.microsoft.com/office/powerpoint/2010/main" val="829197018"/>
+        <p14:creationId xmlns:p14="http://schemas.microsoft.com/office/powerpoint/2010/main" xmlns="" val="829197018"/>
       </p:ext>
     </p:extLst>
   </p:cSld>
@@ -434,7 +434,7 @@
             <a:fld id="{E58A0508-6309-4EAB-8BA6-B85AA67F2995}" type="datetimeFigureOut">
               <a:rPr lang="en-US" smtClean="0"/>
               <a:pPr/>
-              <a:t>13-Dec-15</a:t>
+              <a:t>12/14/2015</a:t>
             </a:fld>
             <a:endParaRPr lang="en-US"/>
           </a:p>
@@ -494,7 +494,7 @@
     </p:spTree>
     <p:extLst>
       <p:ext uri="{BB962C8B-B14F-4D97-AF65-F5344CB8AC3E}">
-        <p14:creationId xmlns:p14="http://schemas.microsoft.com/office/powerpoint/2010/main" val="3499040603"/>
+        <p14:creationId xmlns:p14="http://schemas.microsoft.com/office/powerpoint/2010/main" xmlns="" val="3499040603"/>
       </p:ext>
     </p:extLst>
   </p:cSld>
@@ -631,7 +631,7 @@
             <a:fld id="{E58A0508-6309-4EAB-8BA6-B85AA67F2995}" type="datetimeFigureOut">
               <a:rPr lang="en-US" smtClean="0"/>
               <a:pPr/>
-              <a:t>13-Dec-15</a:t>
+              <a:t>12/14/2015</a:t>
             </a:fld>
             <a:endParaRPr lang="en-US"/>
           </a:p>
@@ -691,7 +691,7 @@
     </p:spTree>
     <p:extLst>
       <p:ext uri="{BB962C8B-B14F-4D97-AF65-F5344CB8AC3E}">
-        <p14:creationId xmlns:p14="http://schemas.microsoft.com/office/powerpoint/2010/main" val="1294682803"/>
+        <p14:creationId xmlns:p14="http://schemas.microsoft.com/office/powerpoint/2010/main" xmlns="" val="1294682803"/>
       </p:ext>
     </p:extLst>
   </p:cSld>
@@ -818,7 +818,7 @@
             <a:fld id="{E58A0508-6309-4EAB-8BA6-B85AA67F2995}" type="datetimeFigureOut">
               <a:rPr lang="en-US" smtClean="0"/>
               <a:pPr/>
-              <a:t>13-Dec-15</a:t>
+              <a:t>12/14/2015</a:t>
             </a:fld>
             <a:endParaRPr lang="en-US"/>
           </a:p>
@@ -878,7 +878,7 @@
     </p:spTree>
     <p:extLst>
       <p:ext uri="{BB962C8B-B14F-4D97-AF65-F5344CB8AC3E}">
-        <p14:creationId xmlns:p14="http://schemas.microsoft.com/office/powerpoint/2010/main" val="141096533"/>
+        <p14:creationId xmlns:p14="http://schemas.microsoft.com/office/powerpoint/2010/main" xmlns="" val="141096533"/>
       </p:ext>
     </p:extLst>
   </p:cSld>
@@ -1027,7 +1027,7 @@
             <a:fld id="{E58A0508-6309-4EAB-8BA6-B85AA67F2995}" type="datetimeFigureOut">
               <a:rPr lang="en-US" smtClean="0"/>
               <a:pPr/>
-              <a:t>13-Dec-15</a:t>
+              <a:t>12/14/2015</a:t>
             </a:fld>
             <a:endParaRPr lang="en-US"/>
           </a:p>
@@ -1087,7 +1087,7 @@
     </p:spTree>
     <p:extLst>
       <p:ext uri="{BB962C8B-B14F-4D97-AF65-F5344CB8AC3E}">
-        <p14:creationId xmlns:p14="http://schemas.microsoft.com/office/powerpoint/2010/main" val="1790837754"/>
+        <p14:creationId xmlns:p14="http://schemas.microsoft.com/office/powerpoint/2010/main" xmlns="" val="1790837754"/>
       </p:ext>
     </p:extLst>
   </p:cSld>
@@ -1332,7 +1332,7 @@
             <a:fld id="{E58A0508-6309-4EAB-8BA6-B85AA67F2995}" type="datetimeFigureOut">
               <a:rPr lang="en-US" smtClean="0"/>
               <a:pPr/>
-              <a:t>13-Dec-15</a:t>
+              <a:t>12/14/2015</a:t>
             </a:fld>
             <a:endParaRPr lang="en-US"/>
           </a:p>
@@ -1392,7 +1392,7 @@
     </p:spTree>
     <p:extLst>
       <p:ext uri="{BB962C8B-B14F-4D97-AF65-F5344CB8AC3E}">
-        <p14:creationId xmlns:p14="http://schemas.microsoft.com/office/powerpoint/2010/main" val="4294623358"/>
+        <p14:creationId xmlns:p14="http://schemas.microsoft.com/office/powerpoint/2010/main" xmlns="" val="4294623358"/>
       </p:ext>
     </p:extLst>
   </p:cSld>
@@ -1771,7 +1771,7 @@
             <a:fld id="{E58A0508-6309-4EAB-8BA6-B85AA67F2995}" type="datetimeFigureOut">
               <a:rPr lang="en-US" smtClean="0"/>
               <a:pPr/>
-              <a:t>13-Dec-15</a:t>
+              <a:t>12/14/2015</a:t>
             </a:fld>
             <a:endParaRPr lang="en-US"/>
           </a:p>
@@ -1831,7 +1831,7 @@
     </p:spTree>
     <p:extLst>
       <p:ext uri="{BB962C8B-B14F-4D97-AF65-F5344CB8AC3E}">
-        <p14:creationId xmlns:p14="http://schemas.microsoft.com/office/powerpoint/2010/main" val="2177959939"/>
+        <p14:creationId xmlns:p14="http://schemas.microsoft.com/office/powerpoint/2010/main" xmlns="" val="2177959939"/>
       </p:ext>
     </p:extLst>
   </p:cSld>
@@ -1906,7 +1906,7 @@
             <a:fld id="{E58A0508-6309-4EAB-8BA6-B85AA67F2995}" type="datetimeFigureOut">
               <a:rPr lang="en-US" smtClean="0"/>
               <a:pPr/>
-              <a:t>13-Dec-15</a:t>
+              <a:t>12/14/2015</a:t>
             </a:fld>
             <a:endParaRPr lang="en-US"/>
           </a:p>
@@ -1966,7 +1966,7 @@
     </p:spTree>
     <p:extLst>
       <p:ext uri="{BB962C8B-B14F-4D97-AF65-F5344CB8AC3E}">
-        <p14:creationId xmlns:p14="http://schemas.microsoft.com/office/powerpoint/2010/main" val="3647597071"/>
+        <p14:creationId xmlns:p14="http://schemas.microsoft.com/office/powerpoint/2010/main" xmlns="" val="3647597071"/>
       </p:ext>
     </p:extLst>
   </p:cSld>
@@ -2018,7 +2018,7 @@
             <a:fld id="{E58A0508-6309-4EAB-8BA6-B85AA67F2995}" type="datetimeFigureOut">
               <a:rPr lang="en-US" smtClean="0"/>
               <a:pPr/>
-              <a:t>13-Dec-15</a:t>
+              <a:t>12/14/2015</a:t>
             </a:fld>
             <a:endParaRPr lang="en-US"/>
           </a:p>
@@ -2078,7 +2078,7 @@
     </p:spTree>
     <p:extLst>
       <p:ext uri="{BB962C8B-B14F-4D97-AF65-F5344CB8AC3E}">
-        <p14:creationId xmlns:p14="http://schemas.microsoft.com/office/powerpoint/2010/main" val="2326664693"/>
+        <p14:creationId xmlns:p14="http://schemas.microsoft.com/office/powerpoint/2010/main" xmlns="" val="2326664693"/>
       </p:ext>
     </p:extLst>
   </p:cSld>
@@ -2312,7 +2312,7 @@
             <a:fld id="{E58A0508-6309-4EAB-8BA6-B85AA67F2995}" type="datetimeFigureOut">
               <a:rPr lang="en-US" smtClean="0"/>
               <a:pPr/>
-              <a:t>13-Dec-15</a:t>
+              <a:t>12/14/2015</a:t>
             </a:fld>
             <a:endParaRPr lang="en-US"/>
           </a:p>
@@ -2372,7 +2372,7 @@
     </p:spTree>
     <p:extLst>
       <p:ext uri="{BB962C8B-B14F-4D97-AF65-F5344CB8AC3E}">
-        <p14:creationId xmlns:p14="http://schemas.microsoft.com/office/powerpoint/2010/main" val="2153272923"/>
+        <p14:creationId xmlns:p14="http://schemas.microsoft.com/office/powerpoint/2010/main" xmlns="" val="2153272923"/>
       </p:ext>
     </p:extLst>
   </p:cSld>
@@ -2586,7 +2586,7 @@
             <a:fld id="{E58A0508-6309-4EAB-8BA6-B85AA67F2995}" type="datetimeFigureOut">
               <a:rPr lang="en-US" smtClean="0"/>
               <a:pPr/>
-              <a:t>13-Dec-15</a:t>
+              <a:t>12/14/2015</a:t>
             </a:fld>
             <a:endParaRPr lang="en-US"/>
           </a:p>
@@ -2646,7 +2646,7 @@
     </p:spTree>
     <p:extLst>
       <p:ext uri="{BB962C8B-B14F-4D97-AF65-F5344CB8AC3E}">
-        <p14:creationId xmlns:p14="http://schemas.microsoft.com/office/powerpoint/2010/main" val="3765760839"/>
+        <p14:creationId xmlns:p14="http://schemas.microsoft.com/office/powerpoint/2010/main" xmlns="" val="3765760839"/>
       </p:ext>
     </p:extLst>
   </p:cSld>
@@ -2713,14 +2713,14 @@
           <a:effectLst/>
           <a:extLst>
             <a:ext uri="{909E8E84-426E-40DD-AFC4-6F175D3DCCD1}">
-              <a14:hiddenFill xmlns:a14="http://schemas.microsoft.com/office/drawing/2010/main">
+              <a14:hiddenFill xmlns:a14="http://schemas.microsoft.com/office/drawing/2010/main" xmlns="">
                 <a:solidFill>
                   <a:schemeClr val="accent1"/>
                 </a:solidFill>
               </a14:hiddenFill>
             </a:ext>
             <a:ext uri="{91240B29-F687-4F45-9708-019B960494DF}">
-              <a14:hiddenLine xmlns:a14="http://schemas.microsoft.com/office/drawing/2010/main" w="9525">
+              <a14:hiddenLine xmlns:a14="http://schemas.microsoft.com/office/drawing/2010/main" xmlns="" w="9525">
                 <a:solidFill>
                   <a:schemeClr val="tx1"/>
                 </a:solidFill>
@@ -2730,7 +2730,7 @@
               </a14:hiddenLine>
             </a:ext>
             <a:ext uri="{AF507438-7753-43E0-B8FC-AC1667EBCBE1}">
-              <a14:hiddenEffects xmlns:a14="http://schemas.microsoft.com/office/drawing/2010/main">
+              <a14:hiddenEffects xmlns:a14="http://schemas.microsoft.com/office/drawing/2010/main" xmlns="">
                 <a:effectLst>
                   <a:outerShdw dist="35921" dir="2700000" algn="ctr" rotWithShape="0">
                     <a:schemeClr val="bg2"/>
@@ -2781,14 +2781,14 @@
           <a:effectLst/>
           <a:extLst>
             <a:ext uri="{909E8E84-426E-40DD-AFC4-6F175D3DCCD1}">
-              <a14:hiddenFill xmlns:a14="http://schemas.microsoft.com/office/drawing/2010/main">
+              <a14:hiddenFill xmlns:a14="http://schemas.microsoft.com/office/drawing/2010/main" xmlns="">
                 <a:solidFill>
                   <a:schemeClr val="accent1"/>
                 </a:solidFill>
               </a14:hiddenFill>
             </a:ext>
             <a:ext uri="{91240B29-F687-4F45-9708-019B960494DF}">
-              <a14:hiddenLine xmlns:a14="http://schemas.microsoft.com/office/drawing/2010/main" w="9525">
+              <a14:hiddenLine xmlns:a14="http://schemas.microsoft.com/office/drawing/2010/main" xmlns="" w="9525">
                 <a:solidFill>
                   <a:schemeClr val="tx1"/>
                 </a:solidFill>
@@ -2798,7 +2798,7 @@
               </a14:hiddenLine>
             </a:ext>
             <a:ext uri="{AF507438-7753-43E0-B8FC-AC1667EBCBE1}">
-              <a14:hiddenEffects xmlns:a14="http://schemas.microsoft.com/office/drawing/2010/main">
+              <a14:hiddenEffects xmlns:a14="http://schemas.microsoft.com/office/drawing/2010/main" xmlns="">
                 <a:effectLst>
                   <a:outerShdw dist="35921" dir="2700000" algn="ctr" rotWithShape="0">
                     <a:schemeClr val="bg2"/>
@@ -2877,14 +2877,14 @@
           <a:effectLst/>
           <a:extLst>
             <a:ext uri="{909E8E84-426E-40DD-AFC4-6F175D3DCCD1}">
-              <a14:hiddenFill xmlns:a14="http://schemas.microsoft.com/office/drawing/2010/main">
+              <a14:hiddenFill xmlns:a14="http://schemas.microsoft.com/office/drawing/2010/main" xmlns="">
                 <a:solidFill>
                   <a:schemeClr val="accent1"/>
                 </a:solidFill>
               </a14:hiddenFill>
             </a:ext>
             <a:ext uri="{91240B29-F687-4F45-9708-019B960494DF}">
-              <a14:hiddenLine xmlns:a14="http://schemas.microsoft.com/office/drawing/2010/main" w="9525">
+              <a14:hiddenLine xmlns:a14="http://schemas.microsoft.com/office/drawing/2010/main" xmlns="" w="9525">
                 <a:solidFill>
                   <a:schemeClr val="tx1"/>
                 </a:solidFill>
@@ -2894,7 +2894,7 @@
               </a14:hiddenLine>
             </a:ext>
             <a:ext uri="{AF507438-7753-43E0-B8FC-AC1667EBCBE1}">
-              <a14:hiddenEffects xmlns:a14="http://schemas.microsoft.com/office/drawing/2010/main">
+              <a14:hiddenEffects xmlns:a14="http://schemas.microsoft.com/office/drawing/2010/main" xmlns="">
                 <a:effectLst>
                   <a:outerShdw dist="35921" dir="2700000" algn="ctr" rotWithShape="0">
                     <a:schemeClr val="bg2"/>
@@ -2919,7 +2919,7 @@
             <a:fld id="{E58A0508-6309-4EAB-8BA6-B85AA67F2995}" type="datetimeFigureOut">
               <a:rPr lang="en-US" smtClean="0"/>
               <a:pPr/>
-              <a:t>13-Dec-15</a:t>
+              <a:t>12/14/2015</a:t>
             </a:fld>
             <a:endParaRPr lang="en-US"/>
           </a:p>
@@ -2950,14 +2950,14 @@
           <a:effectLst/>
           <a:extLst>
             <a:ext uri="{909E8E84-426E-40DD-AFC4-6F175D3DCCD1}">
-              <a14:hiddenFill xmlns:a14="http://schemas.microsoft.com/office/drawing/2010/main">
+              <a14:hiddenFill xmlns:a14="http://schemas.microsoft.com/office/drawing/2010/main" xmlns="">
                 <a:solidFill>
                   <a:schemeClr val="accent1"/>
                 </a:solidFill>
               </a14:hiddenFill>
             </a:ext>
             <a:ext uri="{91240B29-F687-4F45-9708-019B960494DF}">
-              <a14:hiddenLine xmlns:a14="http://schemas.microsoft.com/office/drawing/2010/main" w="9525">
+              <a14:hiddenLine xmlns:a14="http://schemas.microsoft.com/office/drawing/2010/main" xmlns="" w="9525">
                 <a:solidFill>
                   <a:schemeClr val="tx1"/>
                 </a:solidFill>
@@ -2967,7 +2967,7 @@
               </a14:hiddenLine>
             </a:ext>
             <a:ext uri="{AF507438-7753-43E0-B8FC-AC1667EBCBE1}">
-              <a14:hiddenEffects xmlns:a14="http://schemas.microsoft.com/office/drawing/2010/main">
+              <a14:hiddenEffects xmlns:a14="http://schemas.microsoft.com/office/drawing/2010/main" xmlns="">
                 <a:effectLst>
                   <a:outerShdw dist="35921" dir="2700000" algn="ctr" rotWithShape="0">
                     <a:schemeClr val="bg2"/>
@@ -3018,14 +3018,14 @@
           <a:effectLst/>
           <a:extLst>
             <a:ext uri="{909E8E84-426E-40DD-AFC4-6F175D3DCCD1}">
-              <a14:hiddenFill xmlns:a14="http://schemas.microsoft.com/office/drawing/2010/main">
+              <a14:hiddenFill xmlns:a14="http://schemas.microsoft.com/office/drawing/2010/main" xmlns="">
                 <a:solidFill>
                   <a:schemeClr val="accent1"/>
                 </a:solidFill>
               </a14:hiddenFill>
             </a:ext>
             <a:ext uri="{91240B29-F687-4F45-9708-019B960494DF}">
-              <a14:hiddenLine xmlns:a14="http://schemas.microsoft.com/office/drawing/2010/main" w="9525">
+              <a14:hiddenLine xmlns:a14="http://schemas.microsoft.com/office/drawing/2010/main" xmlns="" w="9525">
                 <a:solidFill>
                   <a:schemeClr val="tx1"/>
                 </a:solidFill>
@@ -3035,7 +3035,7 @@
               </a14:hiddenLine>
             </a:ext>
             <a:ext uri="{AF507438-7753-43E0-B8FC-AC1667EBCBE1}">
-              <a14:hiddenEffects xmlns:a14="http://schemas.microsoft.com/office/drawing/2010/main">
+              <a14:hiddenEffects xmlns:a14="http://schemas.microsoft.com/office/drawing/2010/main" xmlns="">
                 <a:effectLst>
                   <a:outerShdw dist="35921" dir="2700000" algn="ctr" rotWithShape="0">
                     <a:schemeClr val="bg2"/>
@@ -3511,13 +3511,7 @@
               <a:rPr lang="sr-Latn-RS" dirty="0" smtClean="0">
                 <a:latin typeface="Calibri" pitchFamily="34" charset="0"/>
               </a:rPr>
-              <a:t>Semantička klasifikacija </a:t>
-            </a:r>
-            <a:r>
-              <a:rPr lang="sr-Latn-RS" dirty="0" smtClean="0">
-                <a:latin typeface="Calibri" pitchFamily="34" charset="0"/>
-              </a:rPr>
-              <a:t>rečenica</a:t>
+              <a:t>Semantička klasifikacija rečenica</a:t>
             </a:r>
             <a:endParaRPr lang="en-US" dirty="0">
               <a:latin typeface="Calibri" pitchFamily="34" charset="0"/>
@@ -3638,7 +3632,7 @@
     </p:spTree>
     <p:extLst>
       <p:ext uri="{BB962C8B-B14F-4D97-AF65-F5344CB8AC3E}">
-        <p14:creationId xmlns:p14="http://schemas.microsoft.com/office/powerpoint/2010/main" val="2329006346"/>
+        <p14:creationId xmlns:p14="http://schemas.microsoft.com/office/powerpoint/2010/main" xmlns="" val="2329006346"/>
       </p:ext>
     </p:extLst>
   </p:cSld>
@@ -3755,7 +3749,7 @@
     </p:spTree>
     <p:extLst>
       <p:ext uri="{BB962C8B-B14F-4D97-AF65-F5344CB8AC3E}">
-        <p14:creationId xmlns:p14="http://schemas.microsoft.com/office/powerpoint/2010/main" val="2675446113"/>
+        <p14:creationId xmlns:p14="http://schemas.microsoft.com/office/powerpoint/2010/main" xmlns="" val="2675446113"/>
       </p:ext>
     </p:extLst>
   </p:cSld>
@@ -3862,7 +3856,7 @@
     </p:spTree>
     <p:extLst>
       <p:ext uri="{BB962C8B-B14F-4D97-AF65-F5344CB8AC3E}">
-        <p14:creationId xmlns:p14="http://schemas.microsoft.com/office/powerpoint/2010/main" val="2572676877"/>
+        <p14:creationId xmlns:p14="http://schemas.microsoft.com/office/powerpoint/2010/main" xmlns="" val="2572676877"/>
       </p:ext>
     </p:extLst>
   </p:cSld>
@@ -4134,10 +4128,10 @@
           <p:nvPr/>
         </p:nvPicPr>
         <p:blipFill>
-          <a:blip r:embed="rId2">
+          <a:blip r:embed="rId2" cstate="print">
             <a:extLst>
               <a:ext uri="{28A0092B-C50C-407E-A947-70E740481C1C}">
-                <a14:useLocalDpi xmlns:a14="http://schemas.microsoft.com/office/drawing/2010/main" val="0"/>
+                <a14:useLocalDpi xmlns:a14="http://schemas.microsoft.com/office/drawing/2010/main" xmlns="" val="0"/>
               </a:ext>
             </a:extLst>
           </a:blip>
@@ -4170,14 +4164,14 @@
           </a:effectLst>
           <a:extLst>
             <a:ext uri="{909E8E84-426E-40DD-AFC4-6F175D3DCCD1}">
-              <a14:hiddenFill xmlns:a14="http://schemas.microsoft.com/office/drawing/2010/main">
+              <a14:hiddenFill xmlns:a14="http://schemas.microsoft.com/office/drawing/2010/main" xmlns="">
                 <a:solidFill>
                   <a:schemeClr val="accent1"/>
                 </a:solidFill>
               </a14:hiddenFill>
             </a:ext>
             <a:ext uri="{91240B29-F687-4F45-9708-019B960494DF}">
-              <a14:hiddenLine xmlns:a14="http://schemas.microsoft.com/office/drawing/2010/main" w="9525">
+              <a14:hiddenLine xmlns:a14="http://schemas.microsoft.com/office/drawing/2010/main" xmlns="" w="9525">
                 <a:solidFill>
                   <a:schemeClr val="tx1"/>
                 </a:solidFill>
@@ -4187,7 +4181,7 @@
               </a14:hiddenLine>
             </a:ext>
             <a:ext uri="{AF507438-7753-43E0-B8FC-AC1667EBCBE1}">
-              <a14:hiddenEffects xmlns:a14="http://schemas.microsoft.com/office/drawing/2010/main">
+              <a14:hiddenEffects xmlns:a14="http://schemas.microsoft.com/office/drawing/2010/main" xmlns="">
                 <a:effectLst>
                   <a:outerShdw dist="35921" dir="2700000" algn="ctr" rotWithShape="0">
                     <a:schemeClr val="bg2"/>
@@ -4201,7 +4195,7 @@
     </p:spTree>
     <p:extLst>
       <p:ext uri="{BB962C8B-B14F-4D97-AF65-F5344CB8AC3E}">
-        <p14:creationId xmlns:p14="http://schemas.microsoft.com/office/powerpoint/2010/main" val="2125068340"/>
+        <p14:creationId xmlns:p14="http://schemas.microsoft.com/office/powerpoint/2010/main" xmlns="" val="2125068340"/>
       </p:ext>
     </p:extLst>
   </p:cSld>
@@ -4247,10 +4241,10 @@
           <p:nvPr/>
         </p:nvPicPr>
         <p:blipFill>
-          <a:blip r:embed="rId2">
+          <a:blip r:embed="rId2" cstate="print">
             <a:extLst>
               <a:ext uri="{28A0092B-C50C-407E-A947-70E740481C1C}">
-                <a14:useLocalDpi xmlns:a14="http://schemas.microsoft.com/office/drawing/2010/main" val="0"/>
+                <a14:useLocalDpi xmlns:a14="http://schemas.microsoft.com/office/drawing/2010/main" xmlns="" val="0"/>
               </a:ext>
             </a:extLst>
           </a:blip>
@@ -4283,14 +4277,14 @@
           </a:effectLst>
           <a:extLst>
             <a:ext uri="{909E8E84-426E-40DD-AFC4-6F175D3DCCD1}">
-              <a14:hiddenFill xmlns:a14="http://schemas.microsoft.com/office/drawing/2010/main">
+              <a14:hiddenFill xmlns:a14="http://schemas.microsoft.com/office/drawing/2010/main" xmlns="">
                 <a:solidFill>
                   <a:schemeClr val="accent1"/>
                 </a:solidFill>
               </a14:hiddenFill>
             </a:ext>
             <a:ext uri="{91240B29-F687-4F45-9708-019B960494DF}">
-              <a14:hiddenLine xmlns:a14="http://schemas.microsoft.com/office/drawing/2010/main" w="9525">
+              <a14:hiddenLine xmlns:a14="http://schemas.microsoft.com/office/drawing/2010/main" xmlns="" w="9525">
                 <a:solidFill>
                   <a:schemeClr val="tx1"/>
                 </a:solidFill>
@@ -4300,7 +4294,7 @@
               </a14:hiddenLine>
             </a:ext>
             <a:ext uri="{AF507438-7753-43E0-B8FC-AC1667EBCBE1}">
-              <a14:hiddenEffects xmlns:a14="http://schemas.microsoft.com/office/drawing/2010/main">
+              <a14:hiddenEffects xmlns:a14="http://schemas.microsoft.com/office/drawing/2010/main" xmlns="">
                 <a:effectLst>
                   <a:outerShdw dist="35921" dir="2700000" algn="ctr" rotWithShape="0">
                     <a:schemeClr val="bg2"/>
@@ -4320,10 +4314,10 @@
           <p:nvPr/>
         </p:nvPicPr>
         <p:blipFill>
-          <a:blip r:embed="rId3">
+          <a:blip r:embed="rId3" cstate="print">
             <a:extLst>
               <a:ext uri="{28A0092B-C50C-407E-A947-70E740481C1C}">
-                <a14:useLocalDpi xmlns:a14="http://schemas.microsoft.com/office/drawing/2010/main" val="0"/>
+                <a14:useLocalDpi xmlns:a14="http://schemas.microsoft.com/office/drawing/2010/main" xmlns="" val="0"/>
               </a:ext>
             </a:extLst>
           </a:blip>
@@ -4356,14 +4350,14 @@
           </a:effectLst>
           <a:extLst>
             <a:ext uri="{909E8E84-426E-40DD-AFC4-6F175D3DCCD1}">
-              <a14:hiddenFill xmlns:a14="http://schemas.microsoft.com/office/drawing/2010/main">
+              <a14:hiddenFill xmlns:a14="http://schemas.microsoft.com/office/drawing/2010/main" xmlns="">
                 <a:solidFill>
                   <a:schemeClr val="accent1"/>
                 </a:solidFill>
               </a14:hiddenFill>
             </a:ext>
             <a:ext uri="{91240B29-F687-4F45-9708-019B960494DF}">
-              <a14:hiddenLine xmlns:a14="http://schemas.microsoft.com/office/drawing/2010/main" w="9525">
+              <a14:hiddenLine xmlns:a14="http://schemas.microsoft.com/office/drawing/2010/main" xmlns="" w="9525">
                 <a:solidFill>
                   <a:schemeClr val="tx1"/>
                 </a:solidFill>
@@ -4373,7 +4367,7 @@
               </a14:hiddenLine>
             </a:ext>
             <a:ext uri="{AF507438-7753-43E0-B8FC-AC1667EBCBE1}">
-              <a14:hiddenEffects xmlns:a14="http://schemas.microsoft.com/office/drawing/2010/main">
+              <a14:hiddenEffects xmlns:a14="http://schemas.microsoft.com/office/drawing/2010/main" xmlns="">
                 <a:effectLst>
                   <a:outerShdw dist="35921" dir="2700000" algn="ctr" rotWithShape="0">
                     <a:schemeClr val="bg2"/>
@@ -4393,10 +4387,10 @@
           <p:nvPr/>
         </p:nvPicPr>
         <p:blipFill>
-          <a:blip r:embed="rId4">
+          <a:blip r:embed="rId4" cstate="print">
             <a:extLst>
               <a:ext uri="{28A0092B-C50C-407E-A947-70E740481C1C}">
-                <a14:useLocalDpi xmlns:a14="http://schemas.microsoft.com/office/drawing/2010/main" val="0"/>
+                <a14:useLocalDpi xmlns:a14="http://schemas.microsoft.com/office/drawing/2010/main" xmlns="" val="0"/>
               </a:ext>
             </a:extLst>
           </a:blip>
@@ -4429,14 +4423,14 @@
           </a:effectLst>
           <a:extLst>
             <a:ext uri="{909E8E84-426E-40DD-AFC4-6F175D3DCCD1}">
-              <a14:hiddenFill xmlns:a14="http://schemas.microsoft.com/office/drawing/2010/main">
+              <a14:hiddenFill xmlns:a14="http://schemas.microsoft.com/office/drawing/2010/main" xmlns="">
                 <a:solidFill>
                   <a:schemeClr val="accent1"/>
                 </a:solidFill>
               </a14:hiddenFill>
             </a:ext>
             <a:ext uri="{91240B29-F687-4F45-9708-019B960494DF}">
-              <a14:hiddenLine xmlns:a14="http://schemas.microsoft.com/office/drawing/2010/main" w="9525">
+              <a14:hiddenLine xmlns:a14="http://schemas.microsoft.com/office/drawing/2010/main" xmlns="" w="9525">
                 <a:solidFill>
                   <a:schemeClr val="tx1"/>
                 </a:solidFill>
@@ -4446,7 +4440,7 @@
               </a14:hiddenLine>
             </a:ext>
             <a:ext uri="{AF507438-7753-43E0-B8FC-AC1667EBCBE1}">
-              <a14:hiddenEffects xmlns:a14="http://schemas.microsoft.com/office/drawing/2010/main">
+              <a14:hiddenEffects xmlns:a14="http://schemas.microsoft.com/office/drawing/2010/main" xmlns="">
                 <a:effectLst>
                   <a:outerShdw dist="35921" dir="2700000" algn="ctr" rotWithShape="0">
                     <a:schemeClr val="bg2"/>
@@ -4460,7 +4454,7 @@
     </p:spTree>
     <p:extLst>
       <p:ext uri="{BB962C8B-B14F-4D97-AF65-F5344CB8AC3E}">
-        <p14:creationId xmlns:p14="http://schemas.microsoft.com/office/powerpoint/2010/main" val="4126158934"/>
+        <p14:creationId xmlns:p14="http://schemas.microsoft.com/office/powerpoint/2010/main" xmlns="" val="4126158934"/>
       </p:ext>
     </p:extLst>
   </p:cSld>
@@ -4556,14 +4550,67 @@
               </a:rPr>
               <a:t>ord2vec</a:t>
             </a:r>
-          </a:p>
-          <a:p>
+            <a:r>
+              <a:rPr lang="en-GB" dirty="0" smtClean="0">
+                <a:latin typeface="Calibri" pitchFamily="34" charset="0"/>
+              </a:rPr>
+              <a:t> – skip-gram model</a:t>
+            </a:r>
             <a:r>
               <a:rPr lang="sr-Latn-RS" dirty="0" smtClean="0">
                 <a:latin typeface="Calibri" pitchFamily="34" charset="0"/>
               </a:rPr>
-              <a:t>CNN</a:t>
-            </a:r>
+              <a:t>, the contiuous bag of words</a:t>
+            </a:r>
+            <a:r>
+              <a:rPr lang="en-GB" dirty="0" smtClean="0">
+                <a:latin typeface="Calibri" pitchFamily="34" charset="0"/>
+              </a:rPr>
+              <a:t> (</a:t>
+            </a:r>
+            <a:r>
+              <a:rPr lang="sr-Latn-RS" smtClean="0">
+                <a:latin typeface="Calibri" pitchFamily="34" charset="0"/>
+              </a:rPr>
+              <a:t>neuronske mreže </a:t>
+            </a:r>
+            <a:r>
+              <a:rPr lang="sr-Latn-RS" dirty="0" smtClean="0">
+                <a:latin typeface="Calibri" pitchFamily="34" charset="0"/>
+              </a:rPr>
+              <a:t>sa jednim skrivenim slojem)</a:t>
+            </a:r>
+            <a:endParaRPr lang="sr-Latn-RS" dirty="0" smtClean="0">
+              <a:latin typeface="Calibri" pitchFamily="34" charset="0"/>
+            </a:endParaRPr>
+          </a:p>
+          <a:p>
+            <a:endParaRPr lang="sr-Latn-RS" dirty="0" smtClean="0">
+              <a:latin typeface="Calibri" pitchFamily="34" charset="0"/>
+            </a:endParaRPr>
+          </a:p>
+          <a:p>
+            <a:endParaRPr lang="sr-Latn-RS" dirty="0" smtClean="0">
+              <a:latin typeface="Calibri" pitchFamily="34" charset="0"/>
+            </a:endParaRPr>
+          </a:p>
+          <a:p>
+            <a:endParaRPr lang="sr-Latn-RS" dirty="0" smtClean="0">
+              <a:latin typeface="Calibri" pitchFamily="34" charset="0"/>
+            </a:endParaRPr>
+          </a:p>
+          <a:p>
+            <a:endParaRPr lang="sr-Latn-RS" dirty="0" smtClean="0">
+              <a:latin typeface="Calibri" pitchFamily="34" charset="0"/>
+            </a:endParaRPr>
+          </a:p>
+          <a:p>
+            <a:pPr>
+              <a:buNone/>
+            </a:pPr>
+            <a:endParaRPr lang="sr-Latn-RS" dirty="0" smtClean="0">
+              <a:latin typeface="Calibri" pitchFamily="34" charset="0"/>
+            </a:endParaRPr>
           </a:p>
           <a:p>
             <a:pPr>
@@ -4573,6 +4620,54 @@
           </a:p>
         </p:txBody>
       </p:sp>
+      <p:pic>
+        <p:nvPicPr>
+          <p:cNvPr id="4" name="Picture 3" descr="skip-gram.png"/>
+          <p:cNvPicPr>
+            <a:picLocks noChangeAspect="1"/>
+          </p:cNvPicPr>
+          <p:nvPr/>
+        </p:nvPicPr>
+        <p:blipFill>
+          <a:blip r:embed="rId2" cstate="print"/>
+          <a:stretch>
+            <a:fillRect/>
+          </a:stretch>
+        </p:blipFill>
+        <p:spPr>
+          <a:xfrm>
+            <a:off x="762000" y="3276600"/>
+            <a:ext cx="3048000" cy="3393440"/>
+          </a:xfrm>
+          <a:prstGeom prst="rect">
+            <a:avLst/>
+          </a:prstGeom>
+        </p:spPr>
+      </p:pic>
+      <p:pic>
+        <p:nvPicPr>
+          <p:cNvPr id="5" name="Picture 4" descr="tcbow.png"/>
+          <p:cNvPicPr>
+            <a:picLocks noChangeAspect="1"/>
+          </p:cNvPicPr>
+          <p:nvPr/>
+        </p:nvPicPr>
+        <p:blipFill>
+          <a:blip r:embed="rId3" cstate="print"/>
+          <a:stretch>
+            <a:fillRect/>
+          </a:stretch>
+        </p:blipFill>
+        <p:spPr>
+          <a:xfrm>
+            <a:off x="4267200" y="3276600"/>
+            <a:ext cx="2514796" cy="3352800"/>
+          </a:xfrm>
+          <a:prstGeom prst="rect">
+            <a:avLst/>
+          </a:prstGeom>
+        </p:spPr>
+      </p:pic>
     </p:spTree>
   </p:cSld>
   <p:clrMapOvr>
@@ -4683,7 +4778,7 @@
     </p:spTree>
     <p:extLst>
       <p:ext uri="{BB962C8B-B14F-4D97-AF65-F5344CB8AC3E}">
-        <p14:creationId xmlns:p14="http://schemas.microsoft.com/office/powerpoint/2010/main" val="1646313305"/>
+        <p14:creationId xmlns:p14="http://schemas.microsoft.com/office/powerpoint/2010/main" xmlns="" val="1646313305"/>
       </p:ext>
     </p:extLst>
   </p:cSld>

</xml_diff>

<commit_message>
Point for Word2Vec added. :)
</commit_message>
<xml_diff>
--- a/semantic_classification_ppt.pptx
+++ b/semantic_classification_ppt.pptx
@@ -13,7 +13,9 @@
     <p:sldId id="262" r:id="rId7"/>
     <p:sldId id="263" r:id="rId8"/>
     <p:sldId id="261" r:id="rId9"/>
-    <p:sldId id="264" r:id="rId10"/>
+    <p:sldId id="266" r:id="rId10"/>
+    <p:sldId id="265" r:id="rId11"/>
+    <p:sldId id="264" r:id="rId12"/>
   </p:sldIdLst>
   <p:sldSz cx="9144000" cy="6858000" type="screen4x3"/>
   <p:notesSz cx="6858000" cy="9144000"/>
@@ -3652,6 +3654,188 @@
 </p:sld>
 </file>
 
+<file path=ppt/slides/slide10.xml><?xml version="1.0" encoding="utf-8"?>
+<p:sld xmlns:a="http://schemas.openxmlformats.org/drawingml/2006/main" xmlns:r="http://schemas.openxmlformats.org/officeDocument/2006/relationships" xmlns:p="http://schemas.openxmlformats.org/presentationml/2006/main">
+  <p:cSld>
+    <p:spTree>
+      <p:nvGrpSpPr>
+        <p:cNvPr id="1" name=""/>
+        <p:cNvGrpSpPr/>
+        <p:nvPr/>
+      </p:nvGrpSpPr>
+      <p:grpSpPr>
+        <a:xfrm>
+          <a:off x="0" y="0"/>
+          <a:ext cx="0" cy="0"/>
+          <a:chOff x="0" y="0"/>
+          <a:chExt cx="0" cy="0"/>
+        </a:xfrm>
+      </p:grpSpPr>
+      <p:sp>
+        <p:nvSpPr>
+          <p:cNvPr id="2" name="Title 1"/>
+          <p:cNvSpPr>
+            <a:spLocks noGrp="1"/>
+          </p:cNvSpPr>
+          <p:nvPr>
+            <p:ph type="title"/>
+          </p:nvPr>
+        </p:nvSpPr>
+        <p:spPr/>
+        <p:txBody>
+          <a:bodyPr/>
+          <a:lstStyle/>
+          <a:p>
+            <a:endParaRPr lang="en-US"/>
+          </a:p>
+        </p:txBody>
+      </p:sp>
+      <p:sp>
+        <p:nvSpPr>
+          <p:cNvPr id="3" name="Content Placeholder 2"/>
+          <p:cNvSpPr>
+            <a:spLocks noGrp="1"/>
+          </p:cNvSpPr>
+          <p:nvPr>
+            <p:ph idx="1"/>
+          </p:nvPr>
+        </p:nvSpPr>
+        <p:spPr/>
+        <p:txBody>
+          <a:bodyPr/>
+          <a:lstStyle/>
+          <a:p>
+            <a:r>
+              <a:rPr lang="sr-Latn-RS" dirty="0" smtClean="0"/>
+              <a:t>Convolutional Neural Networks</a:t>
+            </a:r>
+            <a:endParaRPr lang="en-US" dirty="0"/>
+          </a:p>
+        </p:txBody>
+      </p:sp>
+    </p:spTree>
+  </p:cSld>
+  <p:clrMapOvr>
+    <a:masterClrMapping/>
+  </p:clrMapOvr>
+  <p:transition spd="slow">
+    <p:push dir="u"/>
+  </p:transition>
+</p:sld>
+</file>
+
+<file path=ppt/slides/slide11.xml><?xml version="1.0" encoding="utf-8"?>
+<p:sld xmlns:a="http://schemas.openxmlformats.org/drawingml/2006/main" xmlns:r="http://schemas.openxmlformats.org/officeDocument/2006/relationships" xmlns:p="http://schemas.openxmlformats.org/presentationml/2006/main">
+  <p:cSld>
+    <p:spTree>
+      <p:nvGrpSpPr>
+        <p:cNvPr id="1" name=""/>
+        <p:cNvGrpSpPr/>
+        <p:nvPr/>
+      </p:nvGrpSpPr>
+      <p:grpSpPr>
+        <a:xfrm>
+          <a:off x="0" y="0"/>
+          <a:ext cx="0" cy="0"/>
+          <a:chOff x="0" y="0"/>
+          <a:chExt cx="0" cy="0"/>
+        </a:xfrm>
+      </p:grpSpPr>
+      <p:sp>
+        <p:nvSpPr>
+          <p:cNvPr id="2" name="Title 1"/>
+          <p:cNvSpPr>
+            <a:spLocks noGrp="1"/>
+          </p:cNvSpPr>
+          <p:nvPr>
+            <p:ph type="title"/>
+          </p:nvPr>
+        </p:nvSpPr>
+        <p:spPr/>
+        <p:txBody>
+          <a:bodyPr/>
+          <a:lstStyle/>
+          <a:p>
+            <a:r>
+              <a:rPr lang="sr-Latn-RS" dirty="0" smtClean="0">
+                <a:latin typeface="Calibri" pitchFamily="34" charset="0"/>
+              </a:rPr>
+              <a:t>Više informacija</a:t>
+            </a:r>
+            <a:endParaRPr lang="en-US" dirty="0">
+              <a:latin typeface="Calibri" pitchFamily="34" charset="0"/>
+            </a:endParaRPr>
+          </a:p>
+        </p:txBody>
+      </p:sp>
+      <p:sp>
+        <p:nvSpPr>
+          <p:cNvPr id="3" name="Content Placeholder 2"/>
+          <p:cNvSpPr>
+            <a:spLocks noGrp="1"/>
+          </p:cNvSpPr>
+          <p:nvPr>
+            <p:ph idx="1"/>
+          </p:nvPr>
+        </p:nvSpPr>
+        <p:spPr>
+          <a:xfrm>
+            <a:off x="685800" y="1600200"/>
+            <a:ext cx="8001000" cy="4525963"/>
+          </a:xfrm>
+        </p:spPr>
+        <p:txBody>
+          <a:bodyPr/>
+          <a:lstStyle/>
+          <a:p>
+            <a:pPr marL="0" indent="0">
+              <a:buNone/>
+            </a:pPr>
+            <a:endParaRPr lang="sr-Latn-RS" sz="4400" dirty="0" smtClean="0">
+              <a:latin typeface="Calibri" pitchFamily="34" charset="0"/>
+              <a:hlinkClick r:id="rId2"/>
+            </a:endParaRPr>
+          </a:p>
+          <a:p>
+            <a:pPr marL="0" indent="0" algn="ctr">
+              <a:buNone/>
+            </a:pPr>
+            <a:r>
+              <a:rPr lang="en-US" sz="4400" dirty="0" smtClean="0">
+                <a:latin typeface="Calibri" pitchFamily="34" charset="0"/>
+                <a:hlinkClick r:id="rId2"/>
+              </a:rPr>
+              <a:t>https://github.com/vdragan1993/sentence-classification</a:t>
+            </a:r>
+            <a:endParaRPr lang="en-US" sz="4400" dirty="0">
+              <a:latin typeface="Calibri" pitchFamily="34" charset="0"/>
+            </a:endParaRPr>
+          </a:p>
+        </p:txBody>
+      </p:sp>
+    </p:spTree>
+    <p:extLst>
+      <p:ext uri="{BB962C8B-B14F-4D97-AF65-F5344CB8AC3E}">
+        <p14:creationId xmlns:p14="http://schemas.microsoft.com/office/powerpoint/2010/main" xmlns="" val="1646313305"/>
+      </p:ext>
+    </p:extLst>
+  </p:cSld>
+  <p:clrMapOvr>
+    <a:masterClrMapping/>
+  </p:clrMapOvr>
+  <p:transition spd="slow">
+    <p:push dir="u"/>
+  </p:transition>
+  <p:timing>
+    <p:tnLst>
+      <p:par>
+        <p:cTn id="1" dur="indefinite" restart="never" nodeType="tmRoot"/>
+      </p:par>
+    </p:tnLst>
+  </p:timing>
+</p:sld>
+</file>
+
 <file path=ppt/slides/slide2.xml><?xml version="1.0" encoding="utf-8"?>
 <p:sld xmlns:a="http://schemas.openxmlformats.org/drawingml/2006/main" xmlns:r="http://schemas.openxmlformats.org/officeDocument/2006/relationships" xmlns:p="http://schemas.openxmlformats.org/presentationml/2006/main">
   <p:cSld>
@@ -4569,16 +4753,78 @@
               <a:t> (</a:t>
             </a:r>
             <a:r>
-              <a:rPr lang="sr-Latn-RS" smtClean="0">
-                <a:latin typeface="Calibri" pitchFamily="34" charset="0"/>
-              </a:rPr>
-              <a:t>neuronske mreže </a:t>
-            </a:r>
-            <a:r>
               <a:rPr lang="sr-Latn-RS" dirty="0" smtClean="0">
                 <a:latin typeface="Calibri" pitchFamily="34" charset="0"/>
               </a:rPr>
-              <a:t>sa jednim skrivenim slojem)</a:t>
+              <a:t>neuronske mreže sa jednim skrivenim slojem)</a:t>
+            </a:r>
+          </a:p>
+          <a:p>
+            <a:r>
+              <a:rPr lang="en-GB" dirty="0" smtClean="0">
+                <a:latin typeface="Calibri" pitchFamily="34" charset="0"/>
+              </a:rPr>
+              <a:t>Re</a:t>
+            </a:r>
+            <a:r>
+              <a:rPr lang="sr-Latn-RS" dirty="0" smtClean="0">
+                <a:latin typeface="Calibri" pitchFamily="34" charset="0"/>
+              </a:rPr>
+              <a:t>či su one</a:t>
+            </a:r>
+            <a:r>
+              <a:rPr lang="en-GB" dirty="0" smtClean="0">
+                <a:latin typeface="Calibri" pitchFamily="34" charset="0"/>
+              </a:rPr>
+              <a:t>-hot encoded, </a:t>
+            </a:r>
+            <a:r>
+              <a:rPr lang="en-GB" dirty="0" err="1" smtClean="0">
+                <a:latin typeface="Calibri" pitchFamily="34" charset="0"/>
+              </a:rPr>
+              <a:t>vectori</a:t>
+            </a:r>
+            <a:r>
+              <a:rPr lang="en-GB" dirty="0" smtClean="0">
+                <a:latin typeface="Calibri" pitchFamily="34" charset="0"/>
+              </a:rPr>
+              <a:t> </a:t>
+            </a:r>
+            <a:r>
+              <a:rPr lang="en-GB" dirty="0" err="1" smtClean="0">
+                <a:latin typeface="Calibri" pitchFamily="34" charset="0"/>
+              </a:rPr>
+              <a:t>veli</a:t>
+            </a:r>
+            <a:r>
+              <a:rPr lang="sr-Latn-RS" dirty="0" smtClean="0">
+                <a:latin typeface="Calibri" pitchFamily="34" charset="0"/>
+              </a:rPr>
+              <a:t>čine V </a:t>
+            </a:r>
+            <a:r>
+              <a:rPr lang="en-GB" dirty="0" smtClean="0">
+                <a:latin typeface="Calibri" pitchFamily="34" charset="0"/>
+              </a:rPr>
+              <a:t>–</a:t>
+            </a:r>
+            <a:r>
+              <a:rPr lang="en-GB" dirty="0" err="1" smtClean="0">
+                <a:latin typeface="Calibri" pitchFamily="34" charset="0"/>
+              </a:rPr>
+              <a:t>veli;ina</a:t>
+            </a:r>
+            <a:r>
+              <a:rPr lang="en-GB" dirty="0" smtClean="0">
+                <a:latin typeface="Calibri" pitchFamily="34" charset="0"/>
+              </a:rPr>
+              <a:t> </a:t>
+            </a:r>
+            <a:r>
+              <a:rPr lang="en-GB" dirty="0" err="1" smtClean="0">
+                <a:latin typeface="Calibri" pitchFamily="34" charset="0"/>
+              </a:rPr>
+              <a:t>re;nika</a:t>
             </a:r>
             <a:endParaRPr lang="sr-Latn-RS" dirty="0" smtClean="0">
               <a:latin typeface="Calibri" pitchFamily="34" charset="0"/>
@@ -4620,54 +4866,6 @@
           </a:p>
         </p:txBody>
       </p:sp>
-      <p:pic>
-        <p:nvPicPr>
-          <p:cNvPr id="4" name="Picture 3" descr="skip-gram.png"/>
-          <p:cNvPicPr>
-            <a:picLocks noChangeAspect="1"/>
-          </p:cNvPicPr>
-          <p:nvPr/>
-        </p:nvPicPr>
-        <p:blipFill>
-          <a:blip r:embed="rId2" cstate="print"/>
-          <a:stretch>
-            <a:fillRect/>
-          </a:stretch>
-        </p:blipFill>
-        <p:spPr>
-          <a:xfrm>
-            <a:off x="762000" y="3276600"/>
-            <a:ext cx="3048000" cy="3393440"/>
-          </a:xfrm>
-          <a:prstGeom prst="rect">
-            <a:avLst/>
-          </a:prstGeom>
-        </p:spPr>
-      </p:pic>
-      <p:pic>
-        <p:nvPicPr>
-          <p:cNvPr id="5" name="Picture 4" descr="tcbow.png"/>
-          <p:cNvPicPr>
-            <a:picLocks noChangeAspect="1"/>
-          </p:cNvPicPr>
-          <p:nvPr/>
-        </p:nvPicPr>
-        <p:blipFill>
-          <a:blip r:embed="rId3" cstate="print"/>
-          <a:stretch>
-            <a:fillRect/>
-          </a:stretch>
-        </p:blipFill>
-        <p:spPr>
-          <a:xfrm>
-            <a:off x="4267200" y="3276600"/>
-            <a:ext cx="2514796" cy="3352800"/>
-          </a:xfrm>
-          <a:prstGeom prst="rect">
-            <a:avLst/>
-          </a:prstGeom>
-        </p:spPr>
-      </p:pic>
     </p:spTree>
   </p:cSld>
   <p:clrMapOvr>
@@ -4703,84 +4901,119 @@
           <a:chExt cx="0" cy="0"/>
         </a:xfrm>
       </p:grpSpPr>
-      <p:sp>
-        <p:nvSpPr>
-          <p:cNvPr id="2" name="Title 1"/>
-          <p:cNvSpPr>
-            <a:spLocks noGrp="1"/>
-          </p:cNvSpPr>
-          <p:nvPr>
-            <p:ph type="title"/>
-          </p:nvPr>
-        </p:nvSpPr>
-        <p:spPr/>
-        <p:txBody>
-          <a:bodyPr/>
-          <a:lstStyle/>
-          <a:p>
-            <a:r>
-              <a:rPr lang="sr-Latn-RS" dirty="0" smtClean="0">
-                <a:latin typeface="Calibri" pitchFamily="34" charset="0"/>
-              </a:rPr>
-              <a:t>Više informacija</a:t>
-            </a:r>
-            <a:endParaRPr lang="en-US" dirty="0">
-              <a:latin typeface="Calibri" pitchFamily="34" charset="0"/>
-            </a:endParaRPr>
-          </a:p>
-        </p:txBody>
-      </p:sp>
-      <p:sp>
-        <p:nvSpPr>
-          <p:cNvPr id="3" name="Content Placeholder 2"/>
-          <p:cNvSpPr>
-            <a:spLocks noGrp="1"/>
-          </p:cNvSpPr>
-          <p:nvPr>
-            <p:ph idx="1"/>
-          </p:nvPr>
-        </p:nvSpPr>
+      <p:pic>
+        <p:nvPicPr>
+          <p:cNvPr id="2" name="Picture 1" descr="skip-gram.png"/>
+          <p:cNvPicPr>
+            <a:picLocks noChangeAspect="1"/>
+          </p:cNvPicPr>
+          <p:nvPr/>
+        </p:nvPicPr>
+        <p:blipFill>
+          <a:blip r:embed="rId2" cstate="print"/>
+          <a:stretch>
+            <a:fillRect/>
+          </a:stretch>
+        </p:blipFill>
         <p:spPr>
           <a:xfrm>
-            <a:off x="685800" y="1600200"/>
-            <a:ext cx="8001000" cy="4525963"/>
+            <a:off x="1066800" y="1295400"/>
+            <a:ext cx="3429000" cy="3164840"/>
           </a:xfrm>
+          <a:prstGeom prst="rect">
+            <a:avLst/>
+          </a:prstGeom>
         </p:spPr>
-        <p:txBody>
-          <a:bodyPr/>
+      </p:pic>
+      <p:pic>
+        <p:nvPicPr>
+          <p:cNvPr id="3" name="Picture 2" descr="tcbow.png"/>
+          <p:cNvPicPr>
+            <a:picLocks noChangeAspect="1"/>
+          </p:cNvPicPr>
+          <p:nvPr/>
+        </p:nvPicPr>
+        <p:blipFill>
+          <a:blip r:embed="rId3" cstate="print"/>
+          <a:stretch>
+            <a:fillRect/>
+          </a:stretch>
+        </p:blipFill>
+        <p:spPr>
+          <a:xfrm>
+            <a:off x="5257800" y="1295400"/>
+            <a:ext cx="3352800" cy="3276600"/>
+          </a:xfrm>
+          <a:prstGeom prst="rect">
+            <a:avLst/>
+          </a:prstGeom>
+        </p:spPr>
+      </p:pic>
+      <p:sp>
+        <p:nvSpPr>
+          <p:cNvPr id="4" name="TextBox 3"/>
+          <p:cNvSpPr txBox="1"/>
+          <p:nvPr/>
+        </p:nvSpPr>
+        <p:spPr>
+          <a:xfrm>
+            <a:off x="1752600" y="4419600"/>
+            <a:ext cx="1467068" cy="369332"/>
+          </a:xfrm>
+          <a:prstGeom prst="rect">
+            <a:avLst/>
+          </a:prstGeom>
+          <a:noFill/>
+        </p:spPr>
+        <p:txBody>
+          <a:bodyPr wrap="none" rtlCol="0">
+            <a:spAutoFit/>
+          </a:bodyPr>
           <a:lstStyle/>
           <a:p>
-            <a:pPr marL="0" indent="0">
-              <a:buNone/>
-            </a:pPr>
-            <a:endParaRPr lang="sr-Latn-RS" sz="4400" dirty="0" smtClean="0">
-              <a:latin typeface="Calibri" pitchFamily="34" charset="0"/>
-              <a:hlinkClick r:id="rId2"/>
-            </a:endParaRPr>
-          </a:p>
-          <a:p>
-            <a:pPr marL="0" indent="0" algn="ctr">
-              <a:buNone/>
-            </a:pPr>
-            <a:r>
-              <a:rPr lang="en-US" sz="4400" dirty="0" smtClean="0">
-                <a:latin typeface="Calibri" pitchFamily="34" charset="0"/>
-                <a:hlinkClick r:id="rId2"/>
-              </a:rPr>
-              <a:t>https://github.com/vdragan1993/sentence-classification</a:t>
-            </a:r>
-            <a:endParaRPr lang="en-US" sz="4400" dirty="0">
-              <a:latin typeface="Calibri" pitchFamily="34" charset="0"/>
-            </a:endParaRPr>
+            <a:r>
+              <a:rPr lang="en-GB" dirty="0" smtClean="0"/>
+              <a:t>Skip </a:t>
+            </a:r>
+            <a:r>
+              <a:rPr lang="en-GB" smtClean="0"/>
+              <a:t>– Gram</a:t>
+            </a:r>
+            <a:endParaRPr lang="en-GB" dirty="0" smtClean="0"/>
+          </a:p>
+        </p:txBody>
+      </p:sp>
+      <p:sp>
+        <p:nvSpPr>
+          <p:cNvPr id="5" name="TextBox 4"/>
+          <p:cNvSpPr txBox="1"/>
+          <p:nvPr/>
+        </p:nvSpPr>
+        <p:spPr>
+          <a:xfrm>
+            <a:off x="5410200" y="4495800"/>
+            <a:ext cx="2039982" cy="369332"/>
+          </a:xfrm>
+          <a:prstGeom prst="rect">
+            <a:avLst/>
+          </a:prstGeom>
+          <a:noFill/>
+        </p:spPr>
+        <p:txBody>
+          <a:bodyPr wrap="none" rtlCol="0">
+            <a:spAutoFit/>
+          </a:bodyPr>
+          <a:lstStyle/>
+          <a:p>
+            <a:r>
+              <a:rPr lang="en-GB" dirty="0" smtClean="0"/>
+              <a:t>The Bag of Words</a:t>
+            </a:r>
+            <a:endParaRPr lang="en-US" dirty="0"/>
           </a:p>
         </p:txBody>
       </p:sp>
     </p:spTree>
-    <p:extLst>
-      <p:ext uri="{BB962C8B-B14F-4D97-AF65-F5344CB8AC3E}">
-        <p14:creationId xmlns:p14="http://schemas.microsoft.com/office/powerpoint/2010/main" xmlns="" val="1646313305"/>
-      </p:ext>
-    </p:extLst>
   </p:cSld>
   <p:clrMapOvr>
     <a:masterClrMapping/>
@@ -4788,13 +5021,6 @@
   <p:transition spd="slow">
     <p:push dir="u"/>
   </p:transition>
-  <p:timing>
-    <p:tnLst>
-      <p:par>
-        <p:cTn id="1" dur="indefinite" restart="never" nodeType="tmRoot"/>
-      </p:par>
-    </p:tnLst>
-  </p:timing>
 </p:sld>
 </file>
 

</xml_diff>

<commit_message>
Finished CNN, inserted few pictures.
</commit_message>
<xml_diff>
--- a/semantic_classification_ppt.pptx
+++ b/semantic_classification_ppt.pptx
@@ -15,7 +15,8 @@
     <p:sldId id="261" r:id="rId9"/>
     <p:sldId id="266" r:id="rId10"/>
     <p:sldId id="265" r:id="rId11"/>
-    <p:sldId id="264" r:id="rId12"/>
+    <p:sldId id="267" r:id="rId12"/>
+    <p:sldId id="264" r:id="rId13"/>
   </p:sldIdLst>
   <p:sldSz cx="9144000" cy="6858000" type="screen4x3"/>
   <p:notesSz cx="6858000" cy="9144000"/>
@@ -3700,7 +3701,12 @@
             <p:ph idx="1"/>
           </p:nvPr>
         </p:nvSpPr>
-        <p:spPr/>
+        <p:spPr>
+          <a:xfrm>
+            <a:off x="609600" y="1600200"/>
+            <a:ext cx="8077200" cy="4525963"/>
+          </a:xfrm>
+        </p:spPr>
         <p:txBody>
           <a:bodyPr/>
           <a:lstStyle/>
@@ -3713,6 +3719,44 @@
           </a:p>
         </p:txBody>
       </p:sp>
+      <p:pic>
+        <p:nvPicPr>
+          <p:cNvPr id="1026" name="Picture 2"/>
+          <p:cNvPicPr>
+            <a:picLocks noChangeAspect="1" noChangeArrowheads="1"/>
+          </p:cNvPicPr>
+          <p:nvPr/>
+        </p:nvPicPr>
+        <p:blipFill>
+          <a:blip r:embed="rId2" cstate="print"/>
+          <a:srcRect/>
+          <a:stretch>
+            <a:fillRect/>
+          </a:stretch>
+        </p:blipFill>
+        <p:spPr bwMode="auto">
+          <a:xfrm>
+            <a:off x="838200" y="2286000"/>
+            <a:ext cx="7966605" cy="3581400"/>
+          </a:xfrm>
+          <a:prstGeom prst="rect">
+            <a:avLst/>
+          </a:prstGeom>
+          <a:blipFill dpi="0" rotWithShape="1">
+            <a:blip r:embed="rId3" cstate="print">
+              <a:alphaModFix amt="81000"/>
+            </a:blip>
+            <a:srcRect/>
+            <a:tile tx="0" ty="0" sx="100000" sy="100000" flip="none" algn="tl"/>
+          </a:blipFill>
+          <a:ln w="9525">
+            <a:noFill/>
+            <a:miter lim="800000"/>
+            <a:headEnd/>
+            <a:tailEnd/>
+          </a:ln>
+        </p:spPr>
+      </p:pic>
     </p:spTree>
   </p:cSld>
   <p:clrMapOvr>
@@ -3725,6 +3769,130 @@
 </file>
 
 <file path=ppt/slides/slide11.xml><?xml version="1.0" encoding="utf-8"?>
+<p:sld xmlns:a="http://schemas.openxmlformats.org/drawingml/2006/main" xmlns:r="http://schemas.openxmlformats.org/officeDocument/2006/relationships" xmlns:p="http://schemas.openxmlformats.org/presentationml/2006/main">
+  <p:cSld>
+    <p:spTree>
+      <p:nvGrpSpPr>
+        <p:cNvPr id="1" name=""/>
+        <p:cNvGrpSpPr/>
+        <p:nvPr/>
+      </p:nvGrpSpPr>
+      <p:grpSpPr>
+        <a:xfrm>
+          <a:off x="0" y="0"/>
+          <a:ext cx="0" cy="0"/>
+          <a:chOff x="0" y="0"/>
+          <a:chExt cx="0" cy="0"/>
+        </a:xfrm>
+      </p:grpSpPr>
+      <p:sp>
+        <p:nvSpPr>
+          <p:cNvPr id="6" name="Content Placeholder 5"/>
+          <p:cNvSpPr>
+            <a:spLocks noGrp="1"/>
+          </p:cNvSpPr>
+          <p:nvPr>
+            <p:ph idx="1"/>
+          </p:nvPr>
+        </p:nvSpPr>
+        <p:spPr>
+          <a:xfrm>
+            <a:off x="609600" y="228600"/>
+            <a:ext cx="8077200" cy="6172200"/>
+          </a:xfrm>
+        </p:spPr>
+        <p:txBody>
+          <a:bodyPr/>
+          <a:lstStyle/>
+          <a:p>
+            <a:r>
+              <a:rPr lang="en-US" dirty="0" smtClean="0"/>
+              <a:t>Pooling layers allow for local invariance</a:t>
+            </a:r>
+            <a:r>
+              <a:rPr lang="en-US" dirty="0" smtClean="0"/>
+              <a:t>.</a:t>
+            </a:r>
+            <a:endParaRPr lang="sr-Latn-RS" dirty="0" smtClean="0"/>
+          </a:p>
+          <a:p>
+            <a:r>
+              <a:rPr lang="en-US" dirty="0" smtClean="0"/>
+              <a:t>Training done through </a:t>
+            </a:r>
+            <a:r>
+              <a:rPr lang="en-US" dirty="0" err="1" smtClean="0"/>
+              <a:t>backpropagation</a:t>
+            </a:r>
+            <a:r>
+              <a:rPr lang="en-US" dirty="0" smtClean="0"/>
+              <a:t>.</a:t>
+            </a:r>
+            <a:endParaRPr lang="sr-Latn-RS" dirty="0" smtClean="0"/>
+          </a:p>
+          <a:p>
+            <a:r>
+              <a:rPr lang="en-US" dirty="0" smtClean="0"/>
+              <a:t>Errors are </a:t>
+            </a:r>
+            <a:r>
+              <a:rPr lang="en-US" dirty="0" err="1" smtClean="0"/>
+              <a:t>backpropagated</a:t>
+            </a:r>
+            <a:r>
+              <a:rPr lang="en-US" dirty="0" smtClean="0"/>
+              <a:t> through pooling modules</a:t>
+            </a:r>
+            <a:r>
+              <a:rPr lang="en-US" dirty="0" smtClean="0"/>
+              <a:t>.</a:t>
+            </a:r>
+            <a:endParaRPr lang="sr-Latn-RS" dirty="0" smtClean="0"/>
+          </a:p>
+          <a:p>
+            <a:endParaRPr lang="sr-Latn-RS" dirty="0" smtClean="0"/>
+          </a:p>
+          <a:p>
+            <a:endParaRPr lang="en-US" dirty="0"/>
+          </a:p>
+        </p:txBody>
+      </p:sp>
+      <p:pic>
+        <p:nvPicPr>
+          <p:cNvPr id="9" name="Picture 8" descr="sys.png"/>
+          <p:cNvPicPr>
+            <a:picLocks noChangeAspect="1"/>
+          </p:cNvPicPr>
+          <p:nvPr/>
+        </p:nvPicPr>
+        <p:blipFill>
+          <a:blip r:embed="rId2" cstate="print"/>
+          <a:stretch>
+            <a:fillRect/>
+          </a:stretch>
+        </p:blipFill>
+        <p:spPr>
+          <a:xfrm>
+            <a:off x="609600" y="3398108"/>
+            <a:ext cx="8534400" cy="3459892"/>
+          </a:xfrm>
+          <a:prstGeom prst="rect">
+            <a:avLst/>
+          </a:prstGeom>
+        </p:spPr>
+      </p:pic>
+    </p:spTree>
+  </p:cSld>
+  <p:clrMapOvr>
+    <a:masterClrMapping/>
+  </p:clrMapOvr>
+  <p:transition spd="slow">
+    <p:push dir="u"/>
+  </p:transition>
+</p:sld>
+</file>
+
+<file path=ppt/slides/slide12.xml><?xml version="1.0" encoding="utf-8"?>
 <p:sld xmlns:a="http://schemas.openxmlformats.org/drawingml/2006/main" xmlns:r="http://schemas.openxmlformats.org/officeDocument/2006/relationships" xmlns:p="http://schemas.openxmlformats.org/presentationml/2006/main">
   <p:cSld>
     <p:spTree>
@@ -4782,7 +4950,19 @@
               <a:rPr lang="en-GB" dirty="0" err="1" smtClean="0">
                 <a:latin typeface="Calibri" pitchFamily="34" charset="0"/>
               </a:rPr>
-              <a:t>vectori</a:t>
+              <a:t>ve</a:t>
+            </a:r>
+            <a:r>
+              <a:rPr lang="sr-Latn-RS" dirty="0" smtClean="0">
+                <a:latin typeface="Calibri" pitchFamily="34" charset="0"/>
+              </a:rPr>
+              <a:t>k</a:t>
+            </a:r>
+            <a:r>
+              <a:rPr lang="en-GB" dirty="0" err="1" smtClean="0">
+                <a:latin typeface="Calibri" pitchFamily="34" charset="0"/>
+              </a:rPr>
+              <a:t>tori</a:t>
             </a:r>
             <a:r>
               <a:rPr lang="en-GB" dirty="0" smtClean="0">
@@ -4812,19 +4992,37 @@
               <a:rPr lang="en-GB" dirty="0" err="1" smtClean="0">
                 <a:latin typeface="Calibri" pitchFamily="34" charset="0"/>
               </a:rPr>
-              <a:t>veli;ina</a:t>
+              <a:t>veli</a:t>
+            </a:r>
+            <a:r>
+              <a:rPr lang="sr-Latn-RS" dirty="0" smtClean="0">
+                <a:latin typeface="Calibri" pitchFamily="34" charset="0"/>
+              </a:rPr>
+              <a:t>č</a:t>
+            </a:r>
+            <a:r>
+              <a:rPr lang="en-GB" dirty="0" err="1" smtClean="0">
+                <a:latin typeface="Calibri" pitchFamily="34" charset="0"/>
+              </a:rPr>
+              <a:t>ina</a:t>
             </a:r>
             <a:r>
               <a:rPr lang="en-GB" dirty="0" smtClean="0">
                 <a:latin typeface="Calibri" pitchFamily="34" charset="0"/>
               </a:rPr>
-              <a:t> </a:t>
+              <a:t> re</a:t>
+            </a:r>
+            <a:r>
+              <a:rPr lang="sr-Latn-RS" dirty="0" smtClean="0">
+                <a:latin typeface="Calibri" pitchFamily="34" charset="0"/>
+              </a:rPr>
+              <a:t>č</a:t>
             </a:r>
             <a:r>
               <a:rPr lang="en-GB" dirty="0" err="1" smtClean="0">
                 <a:latin typeface="Calibri" pitchFamily="34" charset="0"/>
               </a:rPr>
-              <a:t>re;nika</a:t>
+              <a:t>nika</a:t>
             </a:r>
             <a:endParaRPr lang="sr-Latn-RS" dirty="0" smtClean="0">
               <a:latin typeface="Calibri" pitchFamily="34" charset="0"/>
@@ -4973,13 +5171,8 @@
           <a:p>
             <a:r>
               <a:rPr lang="en-GB" dirty="0" smtClean="0"/>
-              <a:t>Skip </a:t>
-            </a:r>
-            <a:r>
-              <a:rPr lang="en-GB" smtClean="0"/>
-              <a:t>– Gram</a:t>
-            </a:r>
-            <a:endParaRPr lang="en-GB" dirty="0" smtClean="0"/>
+              <a:t>Skip – Gram</a:t>
+            </a:r>
           </a:p>
         </p:txBody>
       </p:sp>

</xml_diff>